<commit_message>
Meilenstein Trend-Analyse und Meilenstein SummenCharts
</commit_message>
<xml_diff>
--- a/Projectboard/Projectboard/bin/Debug/requirements/templatedossier.pptx
+++ b/Projectboard/Projectboard/bin/Debug/requirements/templatedossier.pptx
@@ -3965,14 +3965,6 @@
                         </a:rPr>
                         <a:t>Ampel</a:t>
                       </a:r>
-                      <a:endParaRPr lang="de-DE" sz="1400" b="1" kern="1200" dirty="0" smtClean="0">
-                        <a:solidFill>
-                          <a:schemeClr val="bg1"/>
-                        </a:solidFill>
-                        <a:latin typeface="+mn-lt"/>
-                        <a:ea typeface="+mn-ea"/>
-                        <a:cs typeface="+mn-cs"/>
-                      </a:endParaRPr>
                     </a:p>
                   </a:txBody>
                   <a:tcPr>
@@ -4008,11 +4000,7 @@
                       </a:pPr>
                       <a:r>
                         <a:rPr lang="de-DE" sz="1400" kern="1200" dirty="0" smtClean="0"/>
-                        <a:t>Letzter </a:t>
-                      </a:r>
-                      <a:r>
-                        <a:rPr lang="de-DE" sz="1400" kern="1200" dirty="0" smtClean="0"/>
-                        <a:t>Stand</a:t>
+                        <a:t>Letzter Stand</a:t>
                       </a:r>
                     </a:p>
                     <a:p>
@@ -4082,14 +4070,6 @@
                         </a:rPr>
                         <a:t>Ampel </a:t>
                       </a:r>
-                      <a:endParaRPr lang="de-DE" sz="1400" b="1" kern="1200" dirty="0" smtClean="0">
-                        <a:solidFill>
-                          <a:schemeClr val="bg1"/>
-                        </a:solidFill>
-                        <a:latin typeface="+mn-lt"/>
-                        <a:ea typeface="+mn-ea"/>
-                        <a:cs typeface="+mn-cs"/>
-                      </a:endParaRPr>
                     </a:p>
                   </a:txBody>
                   <a:tcPr/>
@@ -4668,11 +4648,6 @@
                         </a:rPr>
                         <a:t>14.12.2013</a:t>
                       </a:r>
-                      <a:endParaRPr lang="de-DE" sz="1100" dirty="0" smtClean="0">
-                        <a:solidFill>
-                          <a:schemeClr val="bg1"/>
-                        </a:solidFill>
-                      </a:endParaRPr>
                     </a:p>
                   </a:txBody>
                   <a:tcPr/>

</xml_diff>

<commit_message>
Milestone Trend-Analysis verbessert, in Reporting aufgenommen
</commit_message>
<xml_diff>
--- a/Projectboard/Projectboard/bin/Debug/requirements/templatedossier.pptx
+++ b/Projectboard/Projectboard/bin/Debug/requirements/templatedossier.pptx
@@ -5,12 +5,13 @@
     <p:sldMasterId id="2147483648" r:id="rId1"/>
   </p:sldMasterIdLst>
   <p:notesMasterIdLst>
-    <p:notesMasterId r:id="rId5"/>
+    <p:notesMasterId r:id="rId6"/>
   </p:notesMasterIdLst>
   <p:sldIdLst>
     <p:sldId id="268" r:id="rId2"/>
     <p:sldId id="266" r:id="rId3"/>
-    <p:sldId id="267" r:id="rId4"/>
+    <p:sldId id="269" r:id="rId4"/>
+    <p:sldId id="267" r:id="rId5"/>
   </p:sldIdLst>
   <p:sldSz cx="13004800" cy="9753600"/>
   <p:notesSz cx="6864350" cy="9996488"/>
@@ -1041,6 +1042,281 @@
 </file>
 
 <file path=ppt/notesSlides/notesSlide3.xml><?xml version="1.0" encoding="utf-8"?>
+<p:notes xmlns:a="http://schemas.openxmlformats.org/drawingml/2006/main" xmlns:r="http://schemas.openxmlformats.org/officeDocument/2006/relationships" xmlns:p="http://schemas.openxmlformats.org/presentationml/2006/main">
+  <p:cSld>
+    <p:spTree>
+      <p:nvGrpSpPr>
+        <p:cNvPr id="1" name=""/>
+        <p:cNvGrpSpPr/>
+        <p:nvPr/>
+      </p:nvGrpSpPr>
+      <p:grpSpPr>
+        <a:xfrm>
+          <a:off x="0" y="0"/>
+          <a:ext cx="0" cy="0"/>
+          <a:chOff x="0" y="0"/>
+          <a:chExt cx="0" cy="0"/>
+        </a:xfrm>
+      </p:grpSpPr>
+      <p:sp>
+        <p:nvSpPr>
+          <p:cNvPr id="2" name="Folienbildplatzhalter 1"/>
+          <p:cNvSpPr>
+            <a:spLocks noGrp="1" noRot="1" noChangeAspect="1"/>
+          </p:cNvSpPr>
+          <p:nvPr>
+            <p:ph type="sldImg"/>
+          </p:nvPr>
+        </p:nvSpPr>
+        <p:spPr/>
+      </p:sp>
+      <p:sp>
+        <p:nvSpPr>
+          <p:cNvPr id="3" name="Notizenplatzhalter 2"/>
+          <p:cNvSpPr>
+            <a:spLocks noGrp="1"/>
+          </p:cNvSpPr>
+          <p:nvPr>
+            <p:ph type="body" idx="1"/>
+          </p:nvPr>
+        </p:nvSpPr>
+        <p:spPr/>
+        <p:txBody>
+          <a:bodyPr/>
+          <a:lstStyle/>
+          <a:p>
+            <a:r>
+              <a:rPr lang="de-DE" sz="2500" dirty="0"/>
+              <a:t>Projekt-Name</a:t>
+            </a:r>
+          </a:p>
+          <a:p>
+            <a:r>
+              <a:rPr lang="de-DE" sz="2500" dirty="0"/>
+              <a:t>Ergebnis</a:t>
+            </a:r>
+          </a:p>
+          <a:p>
+            <a:r>
+              <a:rPr lang="de-DE" sz="2500" dirty="0"/>
+              <a:t>Strategie/Risiko</a:t>
+            </a:r>
+          </a:p>
+          <a:p>
+            <a:r>
+              <a:rPr lang="de-DE" sz="2500" dirty="0"/>
+              <a:t>Teilprojekte</a:t>
+            </a:r>
+          </a:p>
+          <a:p>
+            <a:r>
+              <a:rPr lang="de-DE" sz="2500" dirty="0"/>
+              <a:t>Personalbedarf</a:t>
+            </a:r>
+          </a:p>
+          <a:p>
+            <a:r>
+              <a:rPr lang="de-DE" sz="2500" dirty="0"/>
+              <a:t>Personalkosten</a:t>
+            </a:r>
+          </a:p>
+          <a:p>
+            <a:r>
+              <a:rPr lang="de-DE" sz="2500" dirty="0"/>
+              <a:t>Sonstige Kosten</a:t>
+            </a:r>
+          </a:p>
+          <a:p>
+            <a:r>
+              <a:rPr lang="de-DE" sz="2500" dirty="0"/>
+              <a:t>Gesamtkosten</a:t>
+            </a:r>
+          </a:p>
+          <a:p>
+            <a:r>
+              <a:rPr lang="de-DE" sz="2500" dirty="0"/>
+              <a:t>Fortschritt Personalkosten</a:t>
+            </a:r>
+          </a:p>
+          <a:p>
+            <a:r>
+              <a:rPr lang="de-DE" sz="2500" dirty="0"/>
+              <a:t>Fortschritt Sonstige Kosten</a:t>
+            </a:r>
+          </a:p>
+          <a:p>
+            <a:r>
+              <a:rPr lang="de-DE" sz="2500" dirty="0"/>
+              <a:t>Fortschritt Gesamtkosten</a:t>
+            </a:r>
+          </a:p>
+          <a:p>
+            <a:r>
+              <a:rPr lang="de-DE" sz="2500" dirty="0"/>
+              <a:t>Fortschritt Rolle(…)</a:t>
+            </a:r>
+          </a:p>
+          <a:p>
+            <a:r>
+              <a:rPr lang="de-DE" sz="2500" dirty="0"/>
+              <a:t>Fortschritt Kostenart(…)</a:t>
+            </a:r>
+          </a:p>
+          <a:p>
+            <a:endParaRPr lang="de-DE" sz="2500" dirty="0"/>
+          </a:p>
+          <a:p>
+            <a:r>
+              <a:rPr lang="de-DE" sz="2500" dirty="0"/>
+              <a:t>Soll-Ist1 Personalkosten</a:t>
+            </a:r>
+          </a:p>
+          <a:p>
+            <a:pPr defTabSz="481706">
+              <a:lnSpc>
+                <a:spcPts val="3688"/>
+              </a:lnSpc>
+              <a:defRPr/>
+            </a:pPr>
+            <a:r>
+              <a:rPr lang="de-DE" sz="2500" dirty="0"/>
+              <a:t>Soll-Ist2 Personalkosten</a:t>
+            </a:r>
+          </a:p>
+          <a:p>
+            <a:endParaRPr lang="de-DE" sz="2500" dirty="0"/>
+          </a:p>
+          <a:p>
+            <a:r>
+              <a:rPr lang="de-DE" sz="2500" dirty="0"/>
+              <a:t>Soll-Ist1 Sonstige Kosten</a:t>
+            </a:r>
+          </a:p>
+          <a:p>
+            <a:pPr defTabSz="481706">
+              <a:lnSpc>
+                <a:spcPts val="3688"/>
+              </a:lnSpc>
+              <a:defRPr/>
+            </a:pPr>
+            <a:r>
+              <a:rPr lang="de-DE" sz="2500" dirty="0"/>
+              <a:t>Soll-Ist2 Sonstige Kosten</a:t>
+            </a:r>
+          </a:p>
+          <a:p>
+            <a:endParaRPr lang="de-DE" sz="2500" dirty="0"/>
+          </a:p>
+          <a:p>
+            <a:r>
+              <a:rPr lang="de-DE" sz="2500" dirty="0"/>
+              <a:t>Soll-Ist1 Gesamtkosten</a:t>
+            </a:r>
+          </a:p>
+          <a:p>
+            <a:pPr defTabSz="481706">
+              <a:lnSpc>
+                <a:spcPts val="3688"/>
+              </a:lnSpc>
+              <a:defRPr/>
+            </a:pPr>
+            <a:r>
+              <a:rPr lang="de-DE" sz="2500" dirty="0"/>
+              <a:t>Soll-Ist2 Gesamtkosten</a:t>
+            </a:r>
+          </a:p>
+          <a:p>
+            <a:endParaRPr lang="de-DE" sz="2500" dirty="0"/>
+          </a:p>
+          <a:p>
+            <a:r>
+              <a:rPr lang="de-DE" sz="2500" dirty="0"/>
+              <a:t>Soll-Ist1 Rolle (…)</a:t>
+            </a:r>
+          </a:p>
+          <a:p>
+            <a:pPr defTabSz="481706">
+              <a:lnSpc>
+                <a:spcPts val="3688"/>
+              </a:lnSpc>
+              <a:defRPr/>
+            </a:pPr>
+            <a:r>
+              <a:rPr lang="de-DE" sz="2500" dirty="0"/>
+              <a:t>Soll-Ist2 Rolle (…)</a:t>
+            </a:r>
+          </a:p>
+          <a:p>
+            <a:endParaRPr lang="de-DE" sz="2500" dirty="0"/>
+          </a:p>
+          <a:p>
+            <a:r>
+              <a:rPr lang="de-DE" sz="2500" dirty="0"/>
+              <a:t>Soll-Ist1 Kostenart (…)</a:t>
+            </a:r>
+          </a:p>
+          <a:p>
+            <a:pPr defTabSz="481706">
+              <a:lnSpc>
+                <a:spcPts val="3688"/>
+              </a:lnSpc>
+              <a:defRPr/>
+            </a:pPr>
+            <a:r>
+              <a:rPr lang="de-DE" sz="2500" dirty="0"/>
+              <a:t>Soll-Ist2 Kostenart (…)</a:t>
+            </a:r>
+          </a:p>
+          <a:p>
+            <a:endParaRPr lang="de-DE" sz="2500" dirty="0"/>
+          </a:p>
+          <a:p>
+            <a:r>
+              <a:rPr lang="de-DE" sz="2500" dirty="0"/>
+              <a:t>Ampel-Farbe</a:t>
+            </a:r>
+          </a:p>
+          <a:p>
+            <a:r>
+              <a:rPr lang="de-DE" sz="2500" dirty="0"/>
+              <a:t>Beschreibung</a:t>
+            </a:r>
+          </a:p>
+          <a:p>
+            <a:r>
+              <a:rPr lang="de-DE" sz="2500" dirty="0"/>
+              <a:t>Stand:</a:t>
+            </a:r>
+          </a:p>
+          <a:p>
+            <a:r>
+              <a:rPr lang="de-DE" sz="2500" dirty="0"/>
+              <a:t>Laufzeit:</a:t>
+            </a:r>
+          </a:p>
+          <a:p>
+            <a:r>
+              <a:rPr lang="de-DE" sz="2500" dirty="0"/>
+              <a:t>Verantwortlich:</a:t>
+            </a:r>
+            <a:endParaRPr lang="de-DE" dirty="0"/>
+          </a:p>
+        </p:txBody>
+      </p:sp>
+    </p:spTree>
+    <p:extLst>
+      <p:ext uri="{BB962C8B-B14F-4D97-AF65-F5344CB8AC3E}">
+        <p14:creationId xmlns:p14="http://schemas.microsoft.com/office/powerpoint/2010/main" val="1822032258"/>
+      </p:ext>
+    </p:extLst>
+  </p:cSld>
+  <p:clrMapOvr>
+    <a:masterClrMapping/>
+  </p:clrMapOvr>
+</p:notes>
+</file>
+
+<file path=ppt/notesSlides/notesSlide4.xml><?xml version="1.0" encoding="utf-8"?>
 <p:notes xmlns:a="http://schemas.openxmlformats.org/drawingml/2006/main" xmlns:r="http://schemas.openxmlformats.org/officeDocument/2006/relationships" xmlns:p="http://schemas.openxmlformats.org/presentationml/2006/main">
   <p:cSld>
     <p:spTree>
@@ -4886,6 +5162,871 @@
           <a:p>
             <a:r>
               <a:rPr lang="de-DE" sz="4400" dirty="0" smtClean="0"/>
+              <a:t>Meilenstein Trend Analyse</a:t>
+            </a:r>
+            <a:endParaRPr lang="de-DE" dirty="0"/>
+          </a:p>
+        </p:txBody>
+      </p:sp>
+      <p:sp>
+        <p:nvSpPr>
+          <p:cNvPr id="8" name="Rechteck 7"/>
+          <p:cNvSpPr/>
+          <p:nvPr/>
+        </p:nvSpPr>
+        <p:spPr bwMode="auto">
+          <a:xfrm>
+            <a:off x="453728" y="1708448"/>
+            <a:ext cx="12097344" cy="5184576"/>
+          </a:xfrm>
+          <a:prstGeom prst="rect">
+            <a:avLst/>
+          </a:prstGeom>
+          <a:solidFill>
+            <a:srgbClr val="FFFFFF"/>
+          </a:solidFill>
+          <a:ln w="38100" cap="flat" cmpd="sng" algn="ctr">
+            <a:solidFill>
+              <a:schemeClr val="accent1">
+                <a:lumMod val="75000"/>
+              </a:schemeClr>
+            </a:solidFill>
+            <a:prstDash val="solid"/>
+            <a:miter lim="0"/>
+            <a:headEnd type="none" w="med" len="med"/>
+            <a:tailEnd type="none" w="med" len="med"/>
+          </a:ln>
+          <a:effectLst>
+            <a:innerShdw blurRad="63500" dist="50800" dir="18900000">
+              <a:prstClr val="black">
+                <a:alpha val="50000"/>
+              </a:prstClr>
+            </a:innerShdw>
+            <a:softEdge rad="12700"/>
+          </a:effectLst>
+          <a:extLst/>
+        </p:spPr>
+        <p:txBody>
+          <a:bodyPr vert="horz" wrap="square" lIns="50800" tIns="50800" rIns="50800" bIns="50800" numCol="1" rtlCol="0" anchor="ctr" anchorCtr="0" compatLnSpc="1">
+            <a:prstTxWarp prst="textNoShape">
+              <a:avLst/>
+            </a:prstTxWarp>
+          </a:bodyPr>
+          <a:lstStyle/>
+          <a:p>
+            <a:pPr marL="342900"/>
+            <a:r>
+              <a:rPr lang="de-DE" sz="1400" dirty="0"/>
+              <a:t>Meilenstein Trendanalyse</a:t>
+            </a:r>
+            <a:endParaRPr kumimoji="0" lang="de-DE" sz="1800" b="0" i="0" u="none" strike="noStrike" cap="none" normalizeH="0" baseline="0" dirty="0" smtClean="0">
+              <a:ln>
+                <a:noFill/>
+              </a:ln>
+              <a:solidFill>
+                <a:schemeClr val="bg2"/>
+              </a:solidFill>
+              <a:effectLst/>
+              <a:latin typeface="Gill Sans Light" charset="0"/>
+              <a:ea typeface="Gill Sans Light" charset="0"/>
+              <a:cs typeface="Gill Sans Light" charset="0"/>
+              <a:sym typeface="Gill Sans Light" charset="0"/>
+            </a:endParaRPr>
+          </a:p>
+        </p:txBody>
+      </p:sp>
+      <p:sp>
+        <p:nvSpPr>
+          <p:cNvPr id="10" name="Rechteck 9"/>
+          <p:cNvSpPr/>
+          <p:nvPr/>
+        </p:nvSpPr>
+        <p:spPr bwMode="auto">
+          <a:xfrm>
+            <a:off x="453728" y="8929194"/>
+            <a:ext cx="3478120" cy="340094"/>
+          </a:xfrm>
+          <a:prstGeom prst="rect">
+            <a:avLst/>
+          </a:prstGeom>
+          <a:solidFill>
+            <a:srgbClr val="FFFFFF"/>
+          </a:solidFill>
+          <a:ln w="38100" cap="flat" cmpd="sng" algn="ctr">
+            <a:solidFill>
+              <a:schemeClr val="accent1">
+                <a:lumMod val="75000"/>
+              </a:schemeClr>
+            </a:solidFill>
+            <a:prstDash val="solid"/>
+            <a:miter lim="0"/>
+            <a:headEnd type="none" w="med" len="med"/>
+            <a:tailEnd type="none" w="med" len="med"/>
+          </a:ln>
+          <a:effectLst>
+            <a:innerShdw blurRad="63500" dist="50800" dir="18900000">
+              <a:prstClr val="black">
+                <a:alpha val="50000"/>
+              </a:prstClr>
+            </a:innerShdw>
+            <a:softEdge rad="12700"/>
+          </a:effectLst>
+          <a:extLst/>
+        </p:spPr>
+        <p:txBody>
+          <a:bodyPr vert="horz" wrap="square" lIns="0" tIns="50800" rIns="50800" bIns="50800" numCol="1" rtlCol="0" anchor="ctr" anchorCtr="0" compatLnSpc="1">
+            <a:prstTxWarp prst="textNoShape">
+              <a:avLst/>
+            </a:prstTxWarp>
+          </a:bodyPr>
+          <a:lstStyle/>
+          <a:p>
+            <a:pPr marL="342900" algn="l"/>
+            <a:r>
+              <a:rPr lang="de-DE" sz="1400" dirty="0">
+                <a:solidFill>
+                  <a:schemeClr val="bg2"/>
+                </a:solidFill>
+              </a:rPr>
+              <a:t>Stand</a:t>
+            </a:r>
+            <a:r>
+              <a:rPr lang="de-DE" sz="1400" dirty="0" smtClean="0">
+                <a:solidFill>
+                  <a:schemeClr val="bg2"/>
+                </a:solidFill>
+              </a:rPr>
+              <a:t>:</a:t>
+            </a:r>
+            <a:endParaRPr lang="de-DE" sz="1400" dirty="0">
+              <a:solidFill>
+                <a:schemeClr val="bg2"/>
+              </a:solidFill>
+            </a:endParaRPr>
+          </a:p>
+        </p:txBody>
+      </p:sp>
+      <p:sp>
+        <p:nvSpPr>
+          <p:cNvPr id="14" name="Rechteck 13"/>
+          <p:cNvSpPr/>
+          <p:nvPr/>
+        </p:nvSpPr>
+        <p:spPr bwMode="auto">
+          <a:xfrm>
+            <a:off x="9216968" y="8929194"/>
+            <a:ext cx="3478120" cy="340094"/>
+          </a:xfrm>
+          <a:prstGeom prst="rect">
+            <a:avLst/>
+          </a:prstGeom>
+          <a:solidFill>
+            <a:srgbClr val="FFFFFF"/>
+          </a:solidFill>
+          <a:ln w="38100" cap="flat" cmpd="sng" algn="ctr">
+            <a:solidFill>
+              <a:schemeClr val="accent1">
+                <a:lumMod val="75000"/>
+              </a:schemeClr>
+            </a:solidFill>
+            <a:prstDash val="solid"/>
+            <a:miter lim="0"/>
+            <a:headEnd type="none" w="med" len="med"/>
+            <a:tailEnd type="none" w="med" len="med"/>
+          </a:ln>
+          <a:effectLst>
+            <a:innerShdw blurRad="63500" dist="50800" dir="18900000">
+              <a:prstClr val="black">
+                <a:alpha val="50000"/>
+              </a:prstClr>
+            </a:innerShdw>
+            <a:softEdge rad="12700"/>
+          </a:effectLst>
+          <a:extLst/>
+        </p:spPr>
+        <p:txBody>
+          <a:bodyPr vert="horz" wrap="square" lIns="0" tIns="50800" rIns="50800" bIns="50800" numCol="1" rtlCol="0" anchor="ctr" anchorCtr="0" compatLnSpc="1">
+            <a:prstTxWarp prst="textNoShape">
+              <a:avLst/>
+            </a:prstTxWarp>
+          </a:bodyPr>
+          <a:lstStyle/>
+          <a:p>
+            <a:pPr marL="342900" algn="l"/>
+            <a:r>
+              <a:rPr lang="de-DE" sz="1400" dirty="0">
+                <a:solidFill>
+                  <a:schemeClr val="bg2"/>
+                </a:solidFill>
+              </a:rPr>
+              <a:t>Verantwortlich:</a:t>
+            </a:r>
+          </a:p>
+        </p:txBody>
+      </p:sp>
+      <p:sp>
+        <p:nvSpPr>
+          <p:cNvPr id="15" name="Rechteck 14"/>
+          <p:cNvSpPr/>
+          <p:nvPr/>
+        </p:nvSpPr>
+        <p:spPr bwMode="auto">
+          <a:xfrm>
+            <a:off x="4835348" y="8929194"/>
+            <a:ext cx="3478120" cy="340094"/>
+          </a:xfrm>
+          <a:prstGeom prst="rect">
+            <a:avLst/>
+          </a:prstGeom>
+          <a:solidFill>
+            <a:srgbClr val="FFFFFF"/>
+          </a:solidFill>
+          <a:ln w="38100" cap="flat" cmpd="sng" algn="ctr">
+            <a:solidFill>
+              <a:schemeClr val="accent1">
+                <a:lumMod val="75000"/>
+              </a:schemeClr>
+            </a:solidFill>
+            <a:prstDash val="solid"/>
+            <a:miter lim="0"/>
+            <a:headEnd type="none" w="med" len="med"/>
+            <a:tailEnd type="none" w="med" len="med"/>
+          </a:ln>
+          <a:effectLst>
+            <a:innerShdw blurRad="63500" dist="50800" dir="18900000">
+              <a:prstClr val="black">
+                <a:alpha val="50000"/>
+              </a:prstClr>
+            </a:innerShdw>
+            <a:softEdge rad="12700"/>
+          </a:effectLst>
+          <a:extLst/>
+        </p:spPr>
+        <p:txBody>
+          <a:bodyPr vert="horz" wrap="square" lIns="0" tIns="50800" rIns="50800" bIns="50800" numCol="1" rtlCol="0" anchor="ctr" anchorCtr="0" compatLnSpc="1">
+            <a:prstTxWarp prst="textNoShape">
+              <a:avLst/>
+            </a:prstTxWarp>
+          </a:bodyPr>
+          <a:lstStyle/>
+          <a:p>
+            <a:pPr marL="342900" algn="l"/>
+            <a:r>
+              <a:rPr lang="de-DE" sz="1400" dirty="0">
+                <a:solidFill>
+                  <a:schemeClr val="bg2"/>
+                </a:solidFill>
+              </a:rPr>
+              <a:t>Laufzeit</a:t>
+            </a:r>
+            <a:r>
+              <a:rPr lang="de-DE" sz="1400" dirty="0" smtClean="0">
+                <a:solidFill>
+                  <a:schemeClr val="bg2"/>
+                </a:solidFill>
+              </a:rPr>
+              <a:t>:</a:t>
+            </a:r>
+            <a:endParaRPr lang="de-DE" sz="1400" dirty="0">
+              <a:solidFill>
+                <a:schemeClr val="bg2"/>
+              </a:solidFill>
+            </a:endParaRPr>
+          </a:p>
+        </p:txBody>
+      </p:sp>
+      <p:grpSp>
+        <p:nvGrpSpPr>
+          <p:cNvPr id="9" name="Gruppieren 8"/>
+          <p:cNvGrpSpPr/>
+          <p:nvPr/>
+        </p:nvGrpSpPr>
+        <p:grpSpPr>
+          <a:xfrm>
+            <a:off x="381720" y="7181056"/>
+            <a:ext cx="6140784" cy="553998"/>
+            <a:chOff x="3582064" y="7824700"/>
+            <a:chExt cx="6140784" cy="553998"/>
+          </a:xfrm>
+        </p:grpSpPr>
+        <p:sp>
+          <p:nvSpPr>
+            <p:cNvPr id="11" name="Textfeld 10"/>
+            <p:cNvSpPr txBox="1"/>
+            <p:nvPr/>
+          </p:nvSpPr>
+          <p:spPr>
+            <a:xfrm>
+              <a:off x="3582064" y="7824700"/>
+              <a:ext cx="6140784" cy="553998"/>
+            </a:xfrm>
+            <a:prstGeom prst="rect">
+              <a:avLst/>
+            </a:prstGeom>
+            <a:noFill/>
+          </p:spPr>
+          <p:txBody>
+            <a:bodyPr wrap="none" rtlCol="0">
+              <a:spAutoFit/>
+            </a:bodyPr>
+            <a:lstStyle/>
+            <a:p>
+              <a:pPr algn="l">
+                <a:lnSpc>
+                  <a:spcPct val="150000"/>
+                </a:lnSpc>
+              </a:pPr>
+              <a:r>
+                <a:rPr lang="de-DE" sz="1000" dirty="0" smtClean="0"/>
+                <a:t>Die Farbe gibt die „Ampelbewertung“ des Meilensteins zum entsprechenden Planungs-Zeitpunkt wieder: </a:t>
+              </a:r>
+            </a:p>
+            <a:p>
+              <a:pPr algn="l">
+                <a:lnSpc>
+                  <a:spcPct val="150000"/>
+                </a:lnSpc>
+              </a:pPr>
+              <a:r>
+                <a:rPr lang="de-DE" sz="1000" dirty="0" smtClean="0"/>
+                <a:t>grün, gelb, rot oder ohne Bewertung</a:t>
+              </a:r>
+              <a:endParaRPr lang="de-DE" sz="1000" dirty="0"/>
+            </a:p>
+          </p:txBody>
+        </p:sp>
+        <p:grpSp>
+          <p:nvGrpSpPr>
+            <p:cNvPr id="12" name="Gruppieren 11"/>
+            <p:cNvGrpSpPr/>
+            <p:nvPr/>
+          </p:nvGrpSpPr>
+          <p:grpSpPr>
+            <a:xfrm>
+              <a:off x="5967040" y="8154149"/>
+              <a:ext cx="774502" cy="144016"/>
+              <a:chOff x="10840466" y="7986146"/>
+              <a:chExt cx="774502" cy="144016"/>
+            </a:xfrm>
+          </p:grpSpPr>
+          <p:sp>
+            <p:nvSpPr>
+              <p:cNvPr id="13" name="Ellipse 12"/>
+              <p:cNvSpPr/>
+              <p:nvPr/>
+            </p:nvSpPr>
+            <p:spPr bwMode="auto">
+              <a:xfrm>
+                <a:off x="10840466" y="7986146"/>
+                <a:ext cx="144016" cy="144016"/>
+              </a:xfrm>
+              <a:prstGeom prst="ellipse">
+                <a:avLst/>
+              </a:prstGeom>
+              <a:solidFill>
+                <a:srgbClr val="00B050"/>
+              </a:solidFill>
+              <a:ln>
+                <a:noFill/>
+              </a:ln>
+              <a:effectLst/>
+              <a:extLst/>
+            </p:spPr>
+            <p:txBody>
+              <a:bodyPr vert="horz" wrap="square" lIns="50800" tIns="50800" rIns="50800" bIns="50800" numCol="1" rtlCol="0" anchor="ctr" anchorCtr="0" compatLnSpc="1">
+                <a:prstTxWarp prst="textNoShape">
+                  <a:avLst/>
+                </a:prstTxWarp>
+              </a:bodyPr>
+              <a:lstStyle/>
+              <a:p>
+                <a:pPr marL="342900" marR="0" indent="0" algn="ctr" defTabSz="584200" rtl="0" eaLnBrk="1" fontAlgn="base" latinLnBrk="0" hangingPunct="0">
+                  <a:lnSpc>
+                    <a:spcPct val="100000"/>
+                  </a:lnSpc>
+                  <a:spcBef>
+                    <a:spcPct val="0"/>
+                  </a:spcBef>
+                  <a:spcAft>
+                    <a:spcPct val="0"/>
+                  </a:spcAft>
+                  <a:buClrTx/>
+                  <a:buSzTx/>
+                  <a:buFontTx/>
+                  <a:buNone/>
+                  <a:tabLst/>
+                </a:pPr>
+                <a:endParaRPr kumimoji="0" lang="de-DE" sz="3600" b="0" i="0" u="none" strike="noStrike" cap="none" normalizeH="0" baseline="0" smtClean="0">
+                  <a:ln>
+                    <a:noFill/>
+                  </a:ln>
+                  <a:solidFill>
+                    <a:srgbClr val="414141"/>
+                  </a:solidFill>
+                  <a:effectLst/>
+                  <a:latin typeface="Gill Sans Light" charset="0"/>
+                  <a:ea typeface="Gill Sans Light" charset="0"/>
+                  <a:cs typeface="Gill Sans Light" charset="0"/>
+                  <a:sym typeface="Gill Sans Light" charset="0"/>
+                </a:endParaRPr>
+              </a:p>
+            </p:txBody>
+          </p:sp>
+          <p:sp>
+            <p:nvSpPr>
+              <p:cNvPr id="17" name="Ellipse 16"/>
+              <p:cNvSpPr/>
+              <p:nvPr/>
+            </p:nvSpPr>
+            <p:spPr bwMode="auto">
+              <a:xfrm>
+                <a:off x="11050628" y="7986146"/>
+                <a:ext cx="144016" cy="144016"/>
+              </a:xfrm>
+              <a:prstGeom prst="ellipse">
+                <a:avLst/>
+              </a:prstGeom>
+              <a:solidFill>
+                <a:srgbClr val="FFC000"/>
+              </a:solidFill>
+              <a:ln>
+                <a:noFill/>
+              </a:ln>
+              <a:effectLst/>
+              <a:extLst/>
+            </p:spPr>
+            <p:txBody>
+              <a:bodyPr vert="horz" wrap="square" lIns="50800" tIns="50800" rIns="50800" bIns="50800" numCol="1" rtlCol="0" anchor="ctr" anchorCtr="0" compatLnSpc="1">
+                <a:prstTxWarp prst="textNoShape">
+                  <a:avLst/>
+                </a:prstTxWarp>
+              </a:bodyPr>
+              <a:lstStyle/>
+              <a:p>
+                <a:pPr marL="342900" marR="0" indent="0" algn="ctr" defTabSz="584200" rtl="0" eaLnBrk="1" fontAlgn="base" latinLnBrk="0" hangingPunct="0">
+                  <a:lnSpc>
+                    <a:spcPct val="100000"/>
+                  </a:lnSpc>
+                  <a:spcBef>
+                    <a:spcPct val="0"/>
+                  </a:spcBef>
+                  <a:spcAft>
+                    <a:spcPct val="0"/>
+                  </a:spcAft>
+                  <a:buClrTx/>
+                  <a:buSzTx/>
+                  <a:buFontTx/>
+                  <a:buNone/>
+                  <a:tabLst/>
+                </a:pPr>
+                <a:endParaRPr kumimoji="0" lang="de-DE" sz="3600" b="0" i="0" u="none" strike="noStrike" cap="none" normalizeH="0" baseline="0" smtClean="0">
+                  <a:ln>
+                    <a:noFill/>
+                  </a:ln>
+                  <a:solidFill>
+                    <a:srgbClr val="414141"/>
+                  </a:solidFill>
+                  <a:effectLst/>
+                  <a:latin typeface="Gill Sans Light" charset="0"/>
+                  <a:ea typeface="Gill Sans Light" charset="0"/>
+                  <a:cs typeface="Gill Sans Light" charset="0"/>
+                  <a:sym typeface="Gill Sans Light" charset="0"/>
+                </a:endParaRPr>
+              </a:p>
+            </p:txBody>
+          </p:sp>
+          <p:sp>
+            <p:nvSpPr>
+              <p:cNvPr id="18" name="Ellipse 17"/>
+              <p:cNvSpPr/>
+              <p:nvPr/>
+            </p:nvSpPr>
+            <p:spPr bwMode="auto">
+              <a:xfrm>
+                <a:off x="11260790" y="7986146"/>
+                <a:ext cx="144016" cy="144016"/>
+              </a:xfrm>
+              <a:prstGeom prst="ellipse">
+                <a:avLst/>
+              </a:prstGeom>
+              <a:solidFill>
+                <a:srgbClr val="FF0000"/>
+              </a:solidFill>
+              <a:ln>
+                <a:noFill/>
+              </a:ln>
+              <a:effectLst/>
+              <a:extLst/>
+            </p:spPr>
+            <p:txBody>
+              <a:bodyPr vert="horz" wrap="square" lIns="50800" tIns="50800" rIns="50800" bIns="50800" numCol="1" rtlCol="0" anchor="ctr" anchorCtr="0" compatLnSpc="1">
+                <a:prstTxWarp prst="textNoShape">
+                  <a:avLst/>
+                </a:prstTxWarp>
+              </a:bodyPr>
+              <a:lstStyle/>
+              <a:p>
+                <a:pPr marL="342900" marR="0" indent="0" algn="ctr" defTabSz="584200" rtl="0" eaLnBrk="1" fontAlgn="base" latinLnBrk="0" hangingPunct="0">
+                  <a:lnSpc>
+                    <a:spcPct val="100000"/>
+                  </a:lnSpc>
+                  <a:spcBef>
+                    <a:spcPct val="0"/>
+                  </a:spcBef>
+                  <a:spcAft>
+                    <a:spcPct val="0"/>
+                  </a:spcAft>
+                  <a:buClrTx/>
+                  <a:buSzTx/>
+                  <a:buFontTx/>
+                  <a:buNone/>
+                  <a:tabLst/>
+                </a:pPr>
+                <a:endParaRPr kumimoji="0" lang="de-DE" sz="3600" b="0" i="0" u="none" strike="noStrike" cap="none" normalizeH="0" baseline="0" smtClean="0">
+                  <a:ln>
+                    <a:noFill/>
+                  </a:ln>
+                  <a:solidFill>
+                    <a:srgbClr val="414141"/>
+                  </a:solidFill>
+                  <a:effectLst/>
+                  <a:latin typeface="Gill Sans Light" charset="0"/>
+                  <a:ea typeface="Gill Sans Light" charset="0"/>
+                  <a:cs typeface="Gill Sans Light" charset="0"/>
+                  <a:sym typeface="Gill Sans Light" charset="0"/>
+                </a:endParaRPr>
+              </a:p>
+            </p:txBody>
+          </p:sp>
+          <p:sp>
+            <p:nvSpPr>
+              <p:cNvPr id="19" name="Ellipse 18"/>
+              <p:cNvSpPr/>
+              <p:nvPr/>
+            </p:nvSpPr>
+            <p:spPr bwMode="auto">
+              <a:xfrm>
+                <a:off x="11470952" y="7986146"/>
+                <a:ext cx="144016" cy="144016"/>
+              </a:xfrm>
+              <a:prstGeom prst="ellipse">
+                <a:avLst/>
+              </a:prstGeom>
+              <a:solidFill>
+                <a:schemeClr val="bg2">
+                  <a:lumMod val="60000"/>
+                  <a:lumOff val="40000"/>
+                </a:schemeClr>
+              </a:solidFill>
+              <a:ln>
+                <a:noFill/>
+              </a:ln>
+              <a:effectLst/>
+              <a:extLst/>
+            </p:spPr>
+            <p:txBody>
+              <a:bodyPr vert="horz" wrap="square" lIns="50800" tIns="50800" rIns="50800" bIns="50800" numCol="1" rtlCol="0" anchor="ctr" anchorCtr="0" compatLnSpc="1">
+                <a:prstTxWarp prst="textNoShape">
+                  <a:avLst/>
+                </a:prstTxWarp>
+              </a:bodyPr>
+              <a:lstStyle/>
+              <a:p>
+                <a:pPr marL="342900" marR="0" indent="0" algn="ctr" defTabSz="584200" rtl="0" eaLnBrk="1" fontAlgn="base" latinLnBrk="0" hangingPunct="0">
+                  <a:lnSpc>
+                    <a:spcPct val="100000"/>
+                  </a:lnSpc>
+                  <a:spcBef>
+                    <a:spcPct val="0"/>
+                  </a:spcBef>
+                  <a:spcAft>
+                    <a:spcPct val="0"/>
+                  </a:spcAft>
+                  <a:buClrTx/>
+                  <a:buSzTx/>
+                  <a:buFontTx/>
+                  <a:buNone/>
+                  <a:tabLst/>
+                </a:pPr>
+                <a:endParaRPr kumimoji="0" lang="de-DE" sz="3600" b="0" i="0" u="none" strike="noStrike" cap="none" normalizeH="0" baseline="0" smtClean="0">
+                  <a:ln>
+                    <a:noFill/>
+                  </a:ln>
+                  <a:solidFill>
+                    <a:srgbClr val="414141"/>
+                  </a:solidFill>
+                  <a:effectLst/>
+                  <a:latin typeface="Gill Sans Light" charset="0"/>
+                  <a:ea typeface="Gill Sans Light" charset="0"/>
+                  <a:cs typeface="Gill Sans Light" charset="0"/>
+                  <a:sym typeface="Gill Sans Light" charset="0"/>
+                </a:endParaRPr>
+              </a:p>
+            </p:txBody>
+          </p:sp>
+        </p:grpSp>
+      </p:grpSp>
+      <p:grpSp>
+        <p:nvGrpSpPr>
+          <p:cNvPr id="20" name="Gruppieren 19"/>
+          <p:cNvGrpSpPr/>
+          <p:nvPr/>
+        </p:nvGrpSpPr>
+        <p:grpSpPr>
+          <a:xfrm>
+            <a:off x="381720" y="7829128"/>
+            <a:ext cx="7348487" cy="784830"/>
+            <a:chOff x="2819400" y="8340221"/>
+            <a:chExt cx="7348487" cy="784830"/>
+          </a:xfrm>
+        </p:grpSpPr>
+        <p:sp>
+          <p:nvSpPr>
+            <p:cNvPr id="21" name="Textfeld 20"/>
+            <p:cNvSpPr txBox="1"/>
+            <p:nvPr/>
+          </p:nvSpPr>
+          <p:spPr>
+            <a:xfrm>
+              <a:off x="2819400" y="8340221"/>
+              <a:ext cx="7348487" cy="784830"/>
+            </a:xfrm>
+            <a:prstGeom prst="rect">
+              <a:avLst/>
+            </a:prstGeom>
+            <a:noFill/>
+          </p:spPr>
+          <p:txBody>
+            <a:bodyPr wrap="none" rtlCol="0">
+              <a:spAutoFit/>
+            </a:bodyPr>
+            <a:lstStyle/>
+            <a:p>
+              <a:pPr algn="l">
+                <a:lnSpc>
+                  <a:spcPct val="150000"/>
+                </a:lnSpc>
+              </a:pPr>
+              <a:r>
+                <a:rPr lang="de-DE" sz="1000" dirty="0" smtClean="0"/>
+                <a:t>Die Form gibt an, ob der Meilenstein zum jeweiligen Planungs-Stand bereits als abgeschlossen galt oder noch in der Zukunft lag</a:t>
+              </a:r>
+            </a:p>
+            <a:p>
+              <a:pPr marL="514350" lvl="1" indent="-171450" algn="l">
+                <a:lnSpc>
+                  <a:spcPct val="150000"/>
+                </a:lnSpc>
+                <a:buFontTx/>
+                <a:buChar char="-"/>
+              </a:pPr>
+              <a:r>
+                <a:rPr lang="de-DE" sz="1000" dirty="0" smtClean="0"/>
+                <a:t>Meilenstein gilt als abgeschlossen (Ergebnis mit der Ampel-Farbe bewertet)</a:t>
+              </a:r>
+            </a:p>
+            <a:p>
+              <a:pPr marL="514350" lvl="1" indent="-171450" algn="l">
+                <a:lnSpc>
+                  <a:spcPct val="150000"/>
+                </a:lnSpc>
+                <a:buFontTx/>
+                <a:buChar char="-"/>
+              </a:pPr>
+              <a:r>
+                <a:rPr lang="de-DE" sz="1000" dirty="0" smtClean="0"/>
+                <a:t>Meilenstein Prognose (Ergebnis mit der Ampel-Farbe prognostiziert)</a:t>
+              </a:r>
+              <a:endParaRPr lang="de-DE" sz="1000" dirty="0"/>
+            </a:p>
+          </p:txBody>
+        </p:sp>
+        <p:sp>
+          <p:nvSpPr>
+            <p:cNvPr id="22" name="Ellipse 21"/>
+            <p:cNvSpPr/>
+            <p:nvPr/>
+          </p:nvSpPr>
+          <p:spPr bwMode="auto">
+            <a:xfrm>
+              <a:off x="2902000" y="8881619"/>
+              <a:ext cx="144016" cy="144016"/>
+            </a:xfrm>
+            <a:prstGeom prst="ellipse">
+              <a:avLst/>
+            </a:prstGeom>
+            <a:solidFill>
+              <a:srgbClr val="00B050"/>
+            </a:solidFill>
+            <a:ln>
+              <a:noFill/>
+            </a:ln>
+            <a:effectLst/>
+            <a:extLst/>
+          </p:spPr>
+          <p:txBody>
+            <a:bodyPr vert="horz" wrap="square" lIns="50800" tIns="50800" rIns="50800" bIns="50800" numCol="1" rtlCol="0" anchor="ctr" anchorCtr="0" compatLnSpc="1">
+              <a:prstTxWarp prst="textNoShape">
+                <a:avLst/>
+              </a:prstTxWarp>
+            </a:bodyPr>
+            <a:lstStyle/>
+            <a:p>
+              <a:pPr marL="342900" marR="0" indent="0" algn="ctr" defTabSz="584200" rtl="0" eaLnBrk="1" fontAlgn="base" latinLnBrk="0" hangingPunct="0">
+                <a:lnSpc>
+                  <a:spcPct val="100000"/>
+                </a:lnSpc>
+                <a:spcBef>
+                  <a:spcPct val="0"/>
+                </a:spcBef>
+                <a:spcAft>
+                  <a:spcPct val="0"/>
+                </a:spcAft>
+                <a:buClrTx/>
+                <a:buSzTx/>
+                <a:buFontTx/>
+                <a:buNone/>
+                <a:tabLst/>
+              </a:pPr>
+              <a:endParaRPr kumimoji="0" lang="de-DE" sz="3600" b="0" i="0" u="none" strike="noStrike" cap="none" normalizeH="0" baseline="0" smtClean="0">
+                <a:ln>
+                  <a:noFill/>
+                </a:ln>
+                <a:solidFill>
+                  <a:srgbClr val="414141"/>
+                </a:solidFill>
+                <a:effectLst/>
+                <a:latin typeface="Gill Sans Light" charset="0"/>
+                <a:ea typeface="Gill Sans Light" charset="0"/>
+                <a:cs typeface="Gill Sans Light" charset="0"/>
+                <a:sym typeface="Gill Sans Light" charset="0"/>
+              </a:endParaRPr>
+            </a:p>
+          </p:txBody>
+        </p:sp>
+        <p:sp>
+          <p:nvSpPr>
+            <p:cNvPr id="23" name="Rechteck 22"/>
+            <p:cNvSpPr/>
+            <p:nvPr/>
+          </p:nvSpPr>
+          <p:spPr bwMode="auto">
+            <a:xfrm>
+              <a:off x="2902000" y="8649595"/>
+              <a:ext cx="144016" cy="144000"/>
+            </a:xfrm>
+            <a:prstGeom prst="rect">
+              <a:avLst/>
+            </a:prstGeom>
+            <a:solidFill>
+              <a:srgbClr val="00B050"/>
+            </a:solidFill>
+            <a:ln>
+              <a:noFill/>
+            </a:ln>
+            <a:effectLst/>
+            <a:extLst/>
+          </p:spPr>
+          <p:txBody>
+            <a:bodyPr vert="horz" wrap="square" lIns="50800" tIns="50800" rIns="50800" bIns="50800" numCol="1" rtlCol="0" anchor="ctr" anchorCtr="0" compatLnSpc="1">
+              <a:prstTxWarp prst="textNoShape">
+                <a:avLst/>
+              </a:prstTxWarp>
+            </a:bodyPr>
+            <a:lstStyle/>
+            <a:p>
+              <a:pPr marL="342900" marR="0" indent="0" algn="ctr" defTabSz="584200" rtl="0" eaLnBrk="1" fontAlgn="base" latinLnBrk="0" hangingPunct="0">
+                <a:lnSpc>
+                  <a:spcPct val="100000"/>
+                </a:lnSpc>
+                <a:spcBef>
+                  <a:spcPct val="0"/>
+                </a:spcBef>
+                <a:spcAft>
+                  <a:spcPct val="0"/>
+                </a:spcAft>
+                <a:buClrTx/>
+                <a:buSzTx/>
+                <a:buFontTx/>
+                <a:buNone/>
+                <a:tabLst/>
+              </a:pPr>
+              <a:endParaRPr kumimoji="0" lang="de-DE" sz="3600" b="0" i="0" u="none" strike="noStrike" cap="none" normalizeH="0" baseline="0" smtClean="0">
+                <a:ln>
+                  <a:noFill/>
+                </a:ln>
+                <a:solidFill>
+                  <a:srgbClr val="414141"/>
+                </a:solidFill>
+                <a:effectLst/>
+                <a:latin typeface="Gill Sans Light" charset="0"/>
+                <a:ea typeface="Gill Sans Light" charset="0"/>
+                <a:cs typeface="Gill Sans Light" charset="0"/>
+                <a:sym typeface="Gill Sans Light" charset="0"/>
+              </a:endParaRPr>
+            </a:p>
+          </p:txBody>
+        </p:sp>
+      </p:grpSp>
+    </p:spTree>
+    <p:extLst>
+      <p:ext uri="{BB962C8B-B14F-4D97-AF65-F5344CB8AC3E}">
+        <p14:creationId xmlns:p14="http://schemas.microsoft.com/office/powerpoint/2010/main" val="1546635085"/>
+      </p:ext>
+    </p:extLst>
+  </p:cSld>
+  <p:clrMapOvr>
+    <a:masterClrMapping/>
+  </p:clrMapOvr>
+  <p:timing>
+    <p:tnLst>
+      <p:par>
+        <p:cTn id="1" dur="indefinite" restart="never" nodeType="tmRoot"/>
+      </p:par>
+    </p:tnLst>
+  </p:timing>
+</p:sld>
+</file>
+
+<file path=ppt/slides/slide4.xml><?xml version="1.0" encoding="utf-8"?>
+<p:sld xmlns:a="http://schemas.openxmlformats.org/drawingml/2006/main" xmlns:r="http://schemas.openxmlformats.org/officeDocument/2006/relationships" xmlns:p="http://schemas.openxmlformats.org/presentationml/2006/main">
+  <p:cSld>
+    <p:spTree>
+      <p:nvGrpSpPr>
+        <p:cNvPr id="1" name=""/>
+        <p:cNvGrpSpPr/>
+        <p:nvPr/>
+      </p:nvGrpSpPr>
+      <p:grpSpPr>
+        <a:xfrm>
+          <a:off x="0" y="0"/>
+          <a:ext cx="0" cy="0"/>
+          <a:chOff x="0" y="0"/>
+          <a:chExt cx="0" cy="0"/>
+        </a:xfrm>
+      </p:grpSpPr>
+      <p:sp>
+        <p:nvSpPr>
+          <p:cNvPr id="2" name="Titel 1"/>
+          <p:cNvSpPr>
+            <a:spLocks noGrp="1"/>
+          </p:cNvSpPr>
+          <p:nvPr>
+            <p:ph type="title"/>
+          </p:nvPr>
+        </p:nvSpPr>
+        <p:spPr>
+          <a:xfrm>
+            <a:off x="650875" y="390525"/>
+            <a:ext cx="11703050" cy="1245915"/>
+          </a:xfrm>
+        </p:spPr>
+        <p:txBody>
+          <a:bodyPr/>
+          <a:lstStyle/>
+          <a:p>
+            <a:r>
+              <a:rPr lang="de-DE" sz="4400" dirty="0" smtClean="0"/>
               <a:t>Projekt-Name</a:t>
             </a:r>
             <a:endParaRPr lang="de-DE" dirty="0"/>
@@ -4901,7 +6042,7 @@
         <p:spPr bwMode="auto">
           <a:xfrm>
             <a:off x="453728" y="1492424"/>
-            <a:ext cx="8136904" cy="3240360"/>
+            <a:ext cx="6048672" cy="3240360"/>
           </a:xfrm>
           <a:prstGeom prst="rect">
             <a:avLst/>
@@ -5194,8 +6335,8 @@
         </p:nvSpPr>
         <p:spPr bwMode="auto">
           <a:xfrm>
-            <a:off x="8662640" y="1492424"/>
-            <a:ext cx="4032448" cy="3240360"/>
+            <a:off x="6646416" y="1492424"/>
+            <a:ext cx="6048672" cy="3240360"/>
           </a:xfrm>
           <a:prstGeom prst="rect">
             <a:avLst/>

</xml_diff>

<commit_message>
Interaktives vergleichen Termine mit Beauftragung, screenUpdate in Show Strategie-Risiko
</commit_message>
<xml_diff>
--- a/Projectboard/Projectboard/bin/Debug/requirements/templatedossier.pptx
+++ b/Projectboard/Projectboard/bin/Debug/requirements/templatedossier.pptx
@@ -5,13 +5,15 @@
     <p:sldMasterId id="2147483648" r:id="rId1"/>
   </p:sldMasterIdLst>
   <p:notesMasterIdLst>
-    <p:notesMasterId r:id="rId6"/>
+    <p:notesMasterId r:id="rId8"/>
   </p:notesMasterIdLst>
   <p:sldIdLst>
     <p:sldId id="268" r:id="rId2"/>
     <p:sldId id="266" r:id="rId3"/>
     <p:sldId id="269" r:id="rId4"/>
-    <p:sldId id="267" r:id="rId5"/>
+    <p:sldId id="270" r:id="rId5"/>
+    <p:sldId id="271" r:id="rId6"/>
+    <p:sldId id="267" r:id="rId7"/>
   </p:sldIdLst>
   <p:sldSz cx="13004800" cy="9753600"/>
   <p:notesSz cx="6864350" cy="9996488"/>
@@ -1591,6 +1593,556 @@
 </p:notes>
 </file>
 
+<file path=ppt/notesSlides/notesSlide5.xml><?xml version="1.0" encoding="utf-8"?>
+<p:notes xmlns:a="http://schemas.openxmlformats.org/drawingml/2006/main" xmlns:r="http://schemas.openxmlformats.org/officeDocument/2006/relationships" xmlns:p="http://schemas.openxmlformats.org/presentationml/2006/main">
+  <p:cSld>
+    <p:spTree>
+      <p:nvGrpSpPr>
+        <p:cNvPr id="1" name=""/>
+        <p:cNvGrpSpPr/>
+        <p:nvPr/>
+      </p:nvGrpSpPr>
+      <p:grpSpPr>
+        <a:xfrm>
+          <a:off x="0" y="0"/>
+          <a:ext cx="0" cy="0"/>
+          <a:chOff x="0" y="0"/>
+          <a:chExt cx="0" cy="0"/>
+        </a:xfrm>
+      </p:grpSpPr>
+      <p:sp>
+        <p:nvSpPr>
+          <p:cNvPr id="2" name="Folienbildplatzhalter 1"/>
+          <p:cNvSpPr>
+            <a:spLocks noGrp="1" noRot="1" noChangeAspect="1"/>
+          </p:cNvSpPr>
+          <p:nvPr>
+            <p:ph type="sldImg"/>
+          </p:nvPr>
+        </p:nvSpPr>
+        <p:spPr/>
+      </p:sp>
+      <p:sp>
+        <p:nvSpPr>
+          <p:cNvPr id="3" name="Notizenplatzhalter 2"/>
+          <p:cNvSpPr>
+            <a:spLocks noGrp="1"/>
+          </p:cNvSpPr>
+          <p:nvPr>
+            <p:ph type="body" idx="1"/>
+          </p:nvPr>
+        </p:nvSpPr>
+        <p:spPr/>
+        <p:txBody>
+          <a:bodyPr/>
+          <a:lstStyle/>
+          <a:p>
+            <a:r>
+              <a:rPr lang="de-DE" sz="2500" dirty="0"/>
+              <a:t>Projekt-Name</a:t>
+            </a:r>
+          </a:p>
+          <a:p>
+            <a:r>
+              <a:rPr lang="de-DE" sz="2500" dirty="0"/>
+              <a:t>Ergebnis</a:t>
+            </a:r>
+          </a:p>
+          <a:p>
+            <a:r>
+              <a:rPr lang="de-DE" sz="2500" dirty="0"/>
+              <a:t>Strategie/Risiko</a:t>
+            </a:r>
+          </a:p>
+          <a:p>
+            <a:r>
+              <a:rPr lang="de-DE" sz="2500" dirty="0"/>
+              <a:t>Teilprojekte</a:t>
+            </a:r>
+          </a:p>
+          <a:p>
+            <a:r>
+              <a:rPr lang="de-DE" sz="2500" dirty="0"/>
+              <a:t>Personalbedarf</a:t>
+            </a:r>
+          </a:p>
+          <a:p>
+            <a:r>
+              <a:rPr lang="de-DE" sz="2500" dirty="0"/>
+              <a:t>Personalkosten</a:t>
+            </a:r>
+          </a:p>
+          <a:p>
+            <a:r>
+              <a:rPr lang="de-DE" sz="2500" dirty="0"/>
+              <a:t>Sonstige Kosten</a:t>
+            </a:r>
+          </a:p>
+          <a:p>
+            <a:r>
+              <a:rPr lang="de-DE" sz="2500" dirty="0"/>
+              <a:t>Gesamtkosten</a:t>
+            </a:r>
+          </a:p>
+          <a:p>
+            <a:r>
+              <a:rPr lang="de-DE" sz="2500" dirty="0"/>
+              <a:t>Fortschritt Personalkosten</a:t>
+            </a:r>
+          </a:p>
+          <a:p>
+            <a:r>
+              <a:rPr lang="de-DE" sz="2500" dirty="0"/>
+              <a:t>Fortschritt Sonstige Kosten</a:t>
+            </a:r>
+          </a:p>
+          <a:p>
+            <a:r>
+              <a:rPr lang="de-DE" sz="2500" dirty="0"/>
+              <a:t>Fortschritt Gesamtkosten</a:t>
+            </a:r>
+          </a:p>
+          <a:p>
+            <a:r>
+              <a:rPr lang="de-DE" sz="2500" dirty="0"/>
+              <a:t>Fortschritt Rolle(…)</a:t>
+            </a:r>
+          </a:p>
+          <a:p>
+            <a:r>
+              <a:rPr lang="de-DE" sz="2500" dirty="0"/>
+              <a:t>Fortschritt Kostenart(…)</a:t>
+            </a:r>
+          </a:p>
+          <a:p>
+            <a:endParaRPr lang="de-DE" sz="2500" dirty="0"/>
+          </a:p>
+          <a:p>
+            <a:r>
+              <a:rPr lang="de-DE" sz="2500" dirty="0"/>
+              <a:t>Soll-Ist1 Personalkosten</a:t>
+            </a:r>
+          </a:p>
+          <a:p>
+            <a:pPr defTabSz="481706">
+              <a:lnSpc>
+                <a:spcPts val="3688"/>
+              </a:lnSpc>
+              <a:defRPr/>
+            </a:pPr>
+            <a:r>
+              <a:rPr lang="de-DE" sz="2500" dirty="0"/>
+              <a:t>Soll-Ist2 Personalkosten</a:t>
+            </a:r>
+          </a:p>
+          <a:p>
+            <a:endParaRPr lang="de-DE" sz="2500" dirty="0"/>
+          </a:p>
+          <a:p>
+            <a:r>
+              <a:rPr lang="de-DE" sz="2500" dirty="0"/>
+              <a:t>Soll-Ist1 Sonstige Kosten</a:t>
+            </a:r>
+          </a:p>
+          <a:p>
+            <a:pPr defTabSz="481706">
+              <a:lnSpc>
+                <a:spcPts val="3688"/>
+              </a:lnSpc>
+              <a:defRPr/>
+            </a:pPr>
+            <a:r>
+              <a:rPr lang="de-DE" sz="2500" dirty="0"/>
+              <a:t>Soll-Ist2 Sonstige Kosten</a:t>
+            </a:r>
+          </a:p>
+          <a:p>
+            <a:endParaRPr lang="de-DE" sz="2500" dirty="0"/>
+          </a:p>
+          <a:p>
+            <a:r>
+              <a:rPr lang="de-DE" sz="2500" dirty="0"/>
+              <a:t>Soll-Ist1 Gesamtkosten</a:t>
+            </a:r>
+          </a:p>
+          <a:p>
+            <a:pPr defTabSz="481706">
+              <a:lnSpc>
+                <a:spcPts val="3688"/>
+              </a:lnSpc>
+              <a:defRPr/>
+            </a:pPr>
+            <a:r>
+              <a:rPr lang="de-DE" sz="2500" dirty="0"/>
+              <a:t>Soll-Ist2 Gesamtkosten</a:t>
+            </a:r>
+          </a:p>
+          <a:p>
+            <a:endParaRPr lang="de-DE" sz="2500" dirty="0"/>
+          </a:p>
+          <a:p>
+            <a:r>
+              <a:rPr lang="de-DE" sz="2500" dirty="0"/>
+              <a:t>Soll-Ist1 Rolle (…)</a:t>
+            </a:r>
+          </a:p>
+          <a:p>
+            <a:pPr defTabSz="481706">
+              <a:lnSpc>
+                <a:spcPts val="3688"/>
+              </a:lnSpc>
+              <a:defRPr/>
+            </a:pPr>
+            <a:r>
+              <a:rPr lang="de-DE" sz="2500" dirty="0"/>
+              <a:t>Soll-Ist2 Rolle (…)</a:t>
+            </a:r>
+          </a:p>
+          <a:p>
+            <a:endParaRPr lang="de-DE" sz="2500" dirty="0"/>
+          </a:p>
+          <a:p>
+            <a:r>
+              <a:rPr lang="de-DE" sz="2500" dirty="0"/>
+              <a:t>Soll-Ist1 Kostenart (…)</a:t>
+            </a:r>
+          </a:p>
+          <a:p>
+            <a:pPr defTabSz="481706">
+              <a:lnSpc>
+                <a:spcPts val="3688"/>
+              </a:lnSpc>
+              <a:defRPr/>
+            </a:pPr>
+            <a:r>
+              <a:rPr lang="de-DE" sz="2500" dirty="0"/>
+              <a:t>Soll-Ist2 Kostenart (…)</a:t>
+            </a:r>
+          </a:p>
+          <a:p>
+            <a:endParaRPr lang="de-DE" sz="2500" dirty="0"/>
+          </a:p>
+          <a:p>
+            <a:r>
+              <a:rPr lang="de-DE" sz="2500" dirty="0"/>
+              <a:t>Ampel-Farbe</a:t>
+            </a:r>
+          </a:p>
+          <a:p>
+            <a:r>
+              <a:rPr lang="de-DE" sz="2500" dirty="0"/>
+              <a:t>Beschreibung</a:t>
+            </a:r>
+          </a:p>
+          <a:p>
+            <a:r>
+              <a:rPr lang="de-DE" sz="2500" dirty="0"/>
+              <a:t>Stand:</a:t>
+            </a:r>
+          </a:p>
+          <a:p>
+            <a:r>
+              <a:rPr lang="de-DE" sz="2500" dirty="0"/>
+              <a:t>Laufzeit:</a:t>
+            </a:r>
+          </a:p>
+          <a:p>
+            <a:r>
+              <a:rPr lang="de-DE" sz="2500" dirty="0"/>
+              <a:t>Verantwortlich:</a:t>
+            </a:r>
+            <a:endParaRPr lang="de-DE" dirty="0"/>
+          </a:p>
+        </p:txBody>
+      </p:sp>
+    </p:spTree>
+    <p:extLst>
+      <p:ext uri="{BB962C8B-B14F-4D97-AF65-F5344CB8AC3E}">
+        <p14:creationId xmlns:p14="http://schemas.microsoft.com/office/powerpoint/2010/main" val="1822032258"/>
+      </p:ext>
+    </p:extLst>
+  </p:cSld>
+  <p:clrMapOvr>
+    <a:masterClrMapping/>
+  </p:clrMapOvr>
+</p:notes>
+</file>
+
+<file path=ppt/notesSlides/notesSlide6.xml><?xml version="1.0" encoding="utf-8"?>
+<p:notes xmlns:a="http://schemas.openxmlformats.org/drawingml/2006/main" xmlns:r="http://schemas.openxmlformats.org/officeDocument/2006/relationships" xmlns:p="http://schemas.openxmlformats.org/presentationml/2006/main">
+  <p:cSld>
+    <p:spTree>
+      <p:nvGrpSpPr>
+        <p:cNvPr id="1" name=""/>
+        <p:cNvGrpSpPr/>
+        <p:nvPr/>
+      </p:nvGrpSpPr>
+      <p:grpSpPr>
+        <a:xfrm>
+          <a:off x="0" y="0"/>
+          <a:ext cx="0" cy="0"/>
+          <a:chOff x="0" y="0"/>
+          <a:chExt cx="0" cy="0"/>
+        </a:xfrm>
+      </p:grpSpPr>
+      <p:sp>
+        <p:nvSpPr>
+          <p:cNvPr id="2" name="Folienbildplatzhalter 1"/>
+          <p:cNvSpPr>
+            <a:spLocks noGrp="1" noRot="1" noChangeAspect="1"/>
+          </p:cNvSpPr>
+          <p:nvPr>
+            <p:ph type="sldImg"/>
+          </p:nvPr>
+        </p:nvSpPr>
+        <p:spPr/>
+      </p:sp>
+      <p:sp>
+        <p:nvSpPr>
+          <p:cNvPr id="3" name="Notizenplatzhalter 2"/>
+          <p:cNvSpPr>
+            <a:spLocks noGrp="1"/>
+          </p:cNvSpPr>
+          <p:nvPr>
+            <p:ph type="body" idx="1"/>
+          </p:nvPr>
+        </p:nvSpPr>
+        <p:spPr/>
+        <p:txBody>
+          <a:bodyPr/>
+          <a:lstStyle/>
+          <a:p>
+            <a:r>
+              <a:rPr lang="de-DE" sz="2500" dirty="0"/>
+              <a:t>Projekt-Name</a:t>
+            </a:r>
+          </a:p>
+          <a:p>
+            <a:r>
+              <a:rPr lang="de-DE" sz="2500" dirty="0"/>
+              <a:t>Ergebnis</a:t>
+            </a:r>
+          </a:p>
+          <a:p>
+            <a:r>
+              <a:rPr lang="de-DE" sz="2500" dirty="0"/>
+              <a:t>Strategie/Risiko</a:t>
+            </a:r>
+          </a:p>
+          <a:p>
+            <a:r>
+              <a:rPr lang="de-DE" sz="2500" dirty="0"/>
+              <a:t>Teilprojekte</a:t>
+            </a:r>
+          </a:p>
+          <a:p>
+            <a:r>
+              <a:rPr lang="de-DE" sz="2500" dirty="0"/>
+              <a:t>Personalbedarf</a:t>
+            </a:r>
+          </a:p>
+          <a:p>
+            <a:r>
+              <a:rPr lang="de-DE" sz="2500" dirty="0"/>
+              <a:t>Personalkosten</a:t>
+            </a:r>
+          </a:p>
+          <a:p>
+            <a:r>
+              <a:rPr lang="de-DE" sz="2500" dirty="0"/>
+              <a:t>Sonstige Kosten</a:t>
+            </a:r>
+          </a:p>
+          <a:p>
+            <a:r>
+              <a:rPr lang="de-DE" sz="2500" dirty="0"/>
+              <a:t>Gesamtkosten</a:t>
+            </a:r>
+          </a:p>
+          <a:p>
+            <a:r>
+              <a:rPr lang="de-DE" sz="2500" dirty="0"/>
+              <a:t>Fortschritt Personalkosten</a:t>
+            </a:r>
+          </a:p>
+          <a:p>
+            <a:r>
+              <a:rPr lang="de-DE" sz="2500" dirty="0"/>
+              <a:t>Fortschritt Sonstige Kosten</a:t>
+            </a:r>
+          </a:p>
+          <a:p>
+            <a:r>
+              <a:rPr lang="de-DE" sz="2500" dirty="0"/>
+              <a:t>Fortschritt Gesamtkosten</a:t>
+            </a:r>
+          </a:p>
+          <a:p>
+            <a:r>
+              <a:rPr lang="de-DE" sz="2500" dirty="0"/>
+              <a:t>Fortschritt Rolle(…)</a:t>
+            </a:r>
+          </a:p>
+          <a:p>
+            <a:r>
+              <a:rPr lang="de-DE" sz="2500" dirty="0"/>
+              <a:t>Fortschritt Kostenart(…)</a:t>
+            </a:r>
+          </a:p>
+          <a:p>
+            <a:endParaRPr lang="de-DE" sz="2500" dirty="0"/>
+          </a:p>
+          <a:p>
+            <a:r>
+              <a:rPr lang="de-DE" sz="2500" dirty="0"/>
+              <a:t>Soll-Ist1 Personalkosten</a:t>
+            </a:r>
+          </a:p>
+          <a:p>
+            <a:pPr defTabSz="481706">
+              <a:lnSpc>
+                <a:spcPts val="3688"/>
+              </a:lnSpc>
+              <a:defRPr/>
+            </a:pPr>
+            <a:r>
+              <a:rPr lang="de-DE" sz="2500" dirty="0"/>
+              <a:t>Soll-Ist2 Personalkosten</a:t>
+            </a:r>
+          </a:p>
+          <a:p>
+            <a:endParaRPr lang="de-DE" sz="2500" dirty="0"/>
+          </a:p>
+          <a:p>
+            <a:r>
+              <a:rPr lang="de-DE" sz="2500" dirty="0"/>
+              <a:t>Soll-Ist1 Sonstige Kosten</a:t>
+            </a:r>
+          </a:p>
+          <a:p>
+            <a:pPr defTabSz="481706">
+              <a:lnSpc>
+                <a:spcPts val="3688"/>
+              </a:lnSpc>
+              <a:defRPr/>
+            </a:pPr>
+            <a:r>
+              <a:rPr lang="de-DE" sz="2500" dirty="0"/>
+              <a:t>Soll-Ist2 Sonstige Kosten</a:t>
+            </a:r>
+          </a:p>
+          <a:p>
+            <a:endParaRPr lang="de-DE" sz="2500" dirty="0"/>
+          </a:p>
+          <a:p>
+            <a:r>
+              <a:rPr lang="de-DE" sz="2500" dirty="0"/>
+              <a:t>Soll-Ist1 Gesamtkosten</a:t>
+            </a:r>
+          </a:p>
+          <a:p>
+            <a:pPr defTabSz="481706">
+              <a:lnSpc>
+                <a:spcPts val="3688"/>
+              </a:lnSpc>
+              <a:defRPr/>
+            </a:pPr>
+            <a:r>
+              <a:rPr lang="de-DE" sz="2500" dirty="0"/>
+              <a:t>Soll-Ist2 Gesamtkosten</a:t>
+            </a:r>
+          </a:p>
+          <a:p>
+            <a:endParaRPr lang="de-DE" sz="2500" dirty="0"/>
+          </a:p>
+          <a:p>
+            <a:r>
+              <a:rPr lang="de-DE" sz="2500" dirty="0"/>
+              <a:t>Soll-Ist1 Rolle (…)</a:t>
+            </a:r>
+          </a:p>
+          <a:p>
+            <a:pPr defTabSz="481706">
+              <a:lnSpc>
+                <a:spcPts val="3688"/>
+              </a:lnSpc>
+              <a:defRPr/>
+            </a:pPr>
+            <a:r>
+              <a:rPr lang="de-DE" sz="2500" dirty="0"/>
+              <a:t>Soll-Ist2 Rolle (…)</a:t>
+            </a:r>
+          </a:p>
+          <a:p>
+            <a:endParaRPr lang="de-DE" sz="2500" dirty="0"/>
+          </a:p>
+          <a:p>
+            <a:r>
+              <a:rPr lang="de-DE" sz="2500" dirty="0"/>
+              <a:t>Soll-Ist1 Kostenart (…)</a:t>
+            </a:r>
+          </a:p>
+          <a:p>
+            <a:pPr defTabSz="481706">
+              <a:lnSpc>
+                <a:spcPts val="3688"/>
+              </a:lnSpc>
+              <a:defRPr/>
+            </a:pPr>
+            <a:r>
+              <a:rPr lang="de-DE" sz="2500" dirty="0"/>
+              <a:t>Soll-Ist2 Kostenart (…)</a:t>
+            </a:r>
+          </a:p>
+          <a:p>
+            <a:endParaRPr lang="de-DE" sz="2500" dirty="0"/>
+          </a:p>
+          <a:p>
+            <a:r>
+              <a:rPr lang="de-DE" sz="2500" dirty="0"/>
+              <a:t>Ampel-Farbe</a:t>
+            </a:r>
+          </a:p>
+          <a:p>
+            <a:r>
+              <a:rPr lang="de-DE" sz="2500" dirty="0"/>
+              <a:t>Beschreibung</a:t>
+            </a:r>
+          </a:p>
+          <a:p>
+            <a:r>
+              <a:rPr lang="de-DE" sz="2500" dirty="0"/>
+              <a:t>Stand:</a:t>
+            </a:r>
+          </a:p>
+          <a:p>
+            <a:r>
+              <a:rPr lang="de-DE" sz="2500" dirty="0"/>
+              <a:t>Laufzeit:</a:t>
+            </a:r>
+          </a:p>
+          <a:p>
+            <a:r>
+              <a:rPr lang="de-DE" sz="2500" dirty="0"/>
+              <a:t>Verantwortlich:</a:t>
+            </a:r>
+            <a:endParaRPr lang="de-DE" dirty="0"/>
+          </a:p>
+        </p:txBody>
+      </p:sp>
+    </p:spTree>
+    <p:extLst>
+      <p:ext uri="{BB962C8B-B14F-4D97-AF65-F5344CB8AC3E}">
+        <p14:creationId xmlns:p14="http://schemas.microsoft.com/office/powerpoint/2010/main" val="1822032258"/>
+      </p:ext>
+    </p:extLst>
+  </p:cSld>
+  <p:clrMapOvr>
+    <a:masterClrMapping/>
+  </p:clrMapOvr>
+</p:notes>
+</file>
+
 <file path=ppt/slideLayouts/slideLayout1.xml><?xml version="1.0" encoding="utf-8"?>
 <p:sldLayout xmlns:a="http://schemas.openxmlformats.org/drawingml/2006/main" xmlns:r="http://schemas.openxmlformats.org/officeDocument/2006/relationships" xmlns:p="http://schemas.openxmlformats.org/presentationml/2006/main" type="title" preserve="1">
   <p:cSld name="Titelfolie">
@@ -1970,6 +2522,13 @@
     <p:sldLayoutId id="2147483650" r:id="rId1"/>
     <p:sldLayoutId id="2147483654" r:id="rId2"/>
   </p:sldLayoutIdLst>
+  <p:timing>
+    <p:tnLst>
+      <p:par>
+        <p:cTn id="1" dur="indefinite" restart="never" nodeType="tmRoot"/>
+      </p:par>
+    </p:tnLst>
+  </p:timing>
   <p:hf hdr="0" dt="0"/>
   <p:txStyles>
     <p:titleStyle>
@@ -5161,8 +5720,8 @@
           <a:lstStyle/>
           <a:p>
             <a:r>
-              <a:rPr lang="de-DE" sz="4400" dirty="0" smtClean="0"/>
-              <a:t>Meilenstein Trend Analyse</a:t>
+              <a:rPr lang="de-DE" sz="4400" dirty="0"/>
+              <a:t>Projekt-Name</a:t>
             </a:r>
             <a:endParaRPr lang="de-DE" dirty="0"/>
           </a:p>
@@ -5556,7 +6115,7 @@
                   <a:buNone/>
                   <a:tabLst/>
                 </a:pPr>
-                <a:endParaRPr kumimoji="0" lang="de-DE" sz="3600" b="0" i="0" u="none" strike="noStrike" cap="none" normalizeH="0" baseline="0" smtClean="0">
+                <a:endParaRPr kumimoji="0" lang="de-DE" sz="3600" b="0" i="0" u="none" strike="noStrike" cap="none" normalizeH="0" baseline="0" dirty="0" smtClean="0">
                   <a:ln>
                     <a:noFill/>
                   </a:ln>
@@ -5619,7 +6178,7 @@
                   <a:buNone/>
                   <a:tabLst/>
                 </a:pPr>
-                <a:endParaRPr kumimoji="0" lang="de-DE" sz="3600" b="0" i="0" u="none" strike="noStrike" cap="none" normalizeH="0" baseline="0" smtClean="0">
+                <a:endParaRPr kumimoji="0" lang="de-DE" sz="3600" b="0" i="0" u="none" strike="noStrike" cap="none" normalizeH="0" baseline="0" dirty="0" smtClean="0">
                   <a:ln>
                     <a:noFill/>
                   </a:ln>
@@ -5682,7 +6241,7 @@
                   <a:buNone/>
                   <a:tabLst/>
                 </a:pPr>
-                <a:endParaRPr kumimoji="0" lang="de-DE" sz="3600" b="0" i="0" u="none" strike="noStrike" cap="none" normalizeH="0" baseline="0" smtClean="0">
+                <a:endParaRPr kumimoji="0" lang="de-DE" sz="3600" b="0" i="0" u="none" strike="noStrike" cap="none" normalizeH="0" baseline="0" dirty="0" smtClean="0">
                   <a:ln>
                     <a:noFill/>
                   </a:ln>
@@ -5748,7 +6307,7 @@
                   <a:buNone/>
                   <a:tabLst/>
                 </a:pPr>
-                <a:endParaRPr kumimoji="0" lang="de-DE" sz="3600" b="0" i="0" u="none" strike="noStrike" cap="none" normalizeH="0" baseline="0" smtClean="0">
+                <a:endParaRPr kumimoji="0" lang="de-DE" sz="3600" b="0" i="0" u="none" strike="noStrike" cap="none" normalizeH="0" baseline="0" dirty="0" smtClean="0">
                   <a:ln>
                     <a:noFill/>
                   </a:ln>
@@ -5888,7 +6447,7 @@
                 <a:buNone/>
                 <a:tabLst/>
               </a:pPr>
-              <a:endParaRPr kumimoji="0" lang="de-DE" sz="3600" b="0" i="0" u="none" strike="noStrike" cap="none" normalizeH="0" baseline="0" smtClean="0">
+              <a:endParaRPr kumimoji="0" lang="de-DE" sz="3600" b="0" i="0" u="none" strike="noStrike" cap="none" normalizeH="0" baseline="0" dirty="0" smtClean="0">
                 <a:ln>
                   <a:noFill/>
                 </a:ln>
@@ -5951,7 +6510,7 @@
                 <a:buNone/>
                 <a:tabLst/>
               </a:pPr>
-              <a:endParaRPr kumimoji="0" lang="de-DE" sz="3600" b="0" i="0" u="none" strike="noStrike" cap="none" normalizeH="0" baseline="0" smtClean="0">
+              <a:endParaRPr kumimoji="0" lang="de-DE" sz="3600" b="0" i="0" u="none" strike="noStrike" cap="none" normalizeH="0" baseline="0" dirty="0" smtClean="0">
                 <a:ln>
                   <a:noFill/>
                 </a:ln>
@@ -5968,6 +6527,228 @@
           </p:txBody>
         </p:sp>
       </p:grpSp>
+      <p:grpSp>
+        <p:nvGrpSpPr>
+          <p:cNvPr id="24" name="Gruppieren 23"/>
+          <p:cNvGrpSpPr/>
+          <p:nvPr/>
+        </p:nvGrpSpPr>
+        <p:grpSpPr>
+          <a:xfrm>
+            <a:off x="8086576" y="7181056"/>
+            <a:ext cx="4641014" cy="1015663"/>
+            <a:chOff x="2819400" y="8340221"/>
+            <a:chExt cx="4641014" cy="1015663"/>
+          </a:xfrm>
+        </p:grpSpPr>
+        <p:sp>
+          <p:nvSpPr>
+            <p:cNvPr id="25" name="Textfeld 24"/>
+            <p:cNvSpPr txBox="1"/>
+            <p:nvPr/>
+          </p:nvSpPr>
+          <p:spPr>
+            <a:xfrm>
+              <a:off x="2819400" y="8340221"/>
+              <a:ext cx="4641014" cy="1015663"/>
+            </a:xfrm>
+            <a:prstGeom prst="rect">
+              <a:avLst/>
+            </a:prstGeom>
+            <a:noFill/>
+          </p:spPr>
+          <p:txBody>
+            <a:bodyPr wrap="none" rtlCol="0">
+              <a:spAutoFit/>
+            </a:bodyPr>
+            <a:lstStyle/>
+            <a:p>
+              <a:pPr algn="l">
+                <a:lnSpc>
+                  <a:spcPct val="150000"/>
+                </a:lnSpc>
+              </a:pPr>
+              <a:r>
+                <a:rPr lang="de-DE" sz="1000" dirty="0" smtClean="0"/>
+                <a:t>Die </a:t>
+              </a:r>
+              <a:r>
+                <a:rPr lang="de-DE" sz="1000" dirty="0" smtClean="0"/>
+                <a:t>Größe der Form gibt an</a:t>
+              </a:r>
+              <a:r>
+                <a:rPr lang="de-DE" sz="1000" dirty="0" smtClean="0"/>
+                <a:t>, ob </a:t>
+              </a:r>
+              <a:r>
+                <a:rPr lang="de-DE" sz="1000" dirty="0" smtClean="0"/>
+                <a:t>der Status / die Bewertung aus dem Vormonat </a:t>
+              </a:r>
+              <a:br>
+                <a:rPr lang="de-DE" sz="1000" dirty="0" smtClean="0"/>
+              </a:br>
+              <a:r>
+                <a:rPr lang="de-DE" sz="1000" dirty="0" smtClean="0"/>
+                <a:t>übernommen wurde oder ob es eine Bewertung in dem Berichtszeitraum gab</a:t>
+              </a:r>
+              <a:endParaRPr lang="de-DE" sz="1000" dirty="0" smtClean="0"/>
+            </a:p>
+            <a:p>
+              <a:pPr marL="514350" lvl="1" indent="-171450" algn="l">
+                <a:lnSpc>
+                  <a:spcPct val="150000"/>
+                </a:lnSpc>
+                <a:buFontTx/>
+                <a:buChar char="-"/>
+              </a:pPr>
+              <a:r>
+                <a:rPr lang="de-DE" sz="1000" dirty="0" smtClean="0"/>
+                <a:t>Die Bewertung ist aus dem angegebenen Berichtszeitraum</a:t>
+              </a:r>
+            </a:p>
+            <a:p>
+              <a:pPr marL="514350" lvl="1" indent="-171450" algn="l">
+                <a:lnSpc>
+                  <a:spcPct val="150000"/>
+                </a:lnSpc>
+                <a:buFontTx/>
+                <a:buChar char="-"/>
+              </a:pPr>
+              <a:r>
+                <a:rPr lang="de-DE" sz="1000" dirty="0" smtClean="0"/>
+                <a:t>Die Bewertung stammt aus dem Vormonat</a:t>
+              </a:r>
+              <a:endParaRPr lang="de-DE" sz="1000" dirty="0"/>
+            </a:p>
+          </p:txBody>
+        </p:sp>
+        <p:sp>
+          <p:nvSpPr>
+            <p:cNvPr id="26" name="Ellipse 25"/>
+            <p:cNvSpPr/>
+            <p:nvPr/>
+          </p:nvSpPr>
+          <p:spPr bwMode="auto">
+            <a:xfrm>
+              <a:off x="2902000" y="8881619"/>
+              <a:ext cx="180000" cy="180000"/>
+            </a:xfrm>
+            <a:prstGeom prst="ellipse">
+              <a:avLst/>
+            </a:prstGeom>
+            <a:solidFill>
+              <a:srgbClr val="00B050"/>
+            </a:solidFill>
+            <a:ln>
+              <a:noFill/>
+            </a:ln>
+            <a:effectLst/>
+            <a:extLst/>
+          </p:spPr>
+          <p:txBody>
+            <a:bodyPr vert="horz" wrap="square" lIns="50800" tIns="50800" rIns="50800" bIns="50800" numCol="1" rtlCol="0" anchor="ctr" anchorCtr="0" compatLnSpc="1">
+              <a:prstTxWarp prst="textNoShape">
+                <a:avLst/>
+              </a:prstTxWarp>
+            </a:bodyPr>
+            <a:lstStyle/>
+            <a:p>
+              <a:pPr marL="342900" marR="0" indent="0" algn="ctr" defTabSz="584200" rtl="0" eaLnBrk="1" fontAlgn="base" latinLnBrk="0" hangingPunct="0">
+                <a:lnSpc>
+                  <a:spcPct val="100000"/>
+                </a:lnSpc>
+                <a:spcBef>
+                  <a:spcPct val="0"/>
+                </a:spcBef>
+                <a:spcAft>
+                  <a:spcPct val="0"/>
+                </a:spcAft>
+                <a:buClrTx/>
+                <a:buSzTx/>
+                <a:buFontTx/>
+                <a:buNone/>
+                <a:tabLst/>
+              </a:pPr>
+              <a:endParaRPr kumimoji="0" lang="de-DE" sz="3600" b="0" i="0" u="none" strike="noStrike" cap="none" normalizeH="0" baseline="0" dirty="0" smtClean="0">
+                <a:ln>
+                  <a:noFill/>
+                </a:ln>
+                <a:solidFill>
+                  <a:srgbClr val="414141"/>
+                </a:solidFill>
+                <a:effectLst/>
+                <a:latin typeface="Gill Sans Light" charset="0"/>
+                <a:ea typeface="Gill Sans Light" charset="0"/>
+                <a:cs typeface="Gill Sans Light" charset="0"/>
+                <a:sym typeface="Gill Sans Light" charset="0"/>
+              </a:endParaRPr>
+            </a:p>
+          </p:txBody>
+        </p:sp>
+      </p:grpSp>
+      <p:sp>
+        <p:nvSpPr>
+          <p:cNvPr id="28" name="Ellipse 27"/>
+          <p:cNvSpPr/>
+          <p:nvPr/>
+        </p:nvSpPr>
+        <p:spPr bwMode="auto">
+          <a:xfrm>
+            <a:off x="8211412" y="7959192"/>
+            <a:ext cx="108000" cy="108000"/>
+          </a:xfrm>
+          <a:prstGeom prst="ellipse">
+            <a:avLst/>
+          </a:prstGeom>
+          <a:solidFill>
+            <a:srgbClr val="00B050"/>
+          </a:solidFill>
+          <a:ln>
+            <a:noFill/>
+          </a:ln>
+          <a:effectLst/>
+          <a:extLst/>
+        </p:spPr>
+        <p:txBody>
+          <a:bodyPr vert="horz" wrap="square" lIns="50800" tIns="50800" rIns="50800" bIns="50800" numCol="1" rtlCol="0" anchor="ctr" anchorCtr="0" compatLnSpc="1">
+            <a:prstTxWarp prst="textNoShape">
+              <a:avLst/>
+            </a:prstTxWarp>
+          </a:bodyPr>
+          <a:lstStyle/>
+          <a:p>
+            <a:pPr marL="342900" marR="0" indent="0" algn="ctr" defTabSz="584200" rtl="0" eaLnBrk="1" fontAlgn="base" latinLnBrk="0" hangingPunct="0">
+              <a:lnSpc>
+                <a:spcPct val="100000"/>
+              </a:lnSpc>
+              <a:spcBef>
+                <a:spcPct val="0"/>
+              </a:spcBef>
+              <a:spcAft>
+                <a:spcPct val="0"/>
+              </a:spcAft>
+              <a:buClrTx/>
+              <a:buSzTx/>
+              <a:buFontTx/>
+              <a:buNone/>
+              <a:tabLst/>
+            </a:pPr>
+            <a:endParaRPr kumimoji="0" lang="de-DE" sz="3600" b="0" i="0" u="none" strike="noStrike" cap="none" normalizeH="0" baseline="0" dirty="0" smtClean="0">
+              <a:ln>
+                <a:noFill/>
+              </a:ln>
+              <a:solidFill>
+                <a:srgbClr val="414141"/>
+              </a:solidFill>
+              <a:effectLst/>
+              <a:latin typeface="Gill Sans Light" charset="0"/>
+              <a:ea typeface="Gill Sans Light" charset="0"/>
+              <a:cs typeface="Gill Sans Light" charset="0"/>
+              <a:sym typeface="Gill Sans Light" charset="0"/>
+            </a:endParaRPr>
+          </a:p>
+        </p:txBody>
+      </p:sp>
     </p:spTree>
     <p:extLst>
       <p:ext uri="{BB962C8B-B14F-4D97-AF65-F5344CB8AC3E}">
@@ -5989,6 +6770,766 @@
 </file>
 
 <file path=ppt/slides/slide4.xml><?xml version="1.0" encoding="utf-8"?>
+<p:sld xmlns:a="http://schemas.openxmlformats.org/drawingml/2006/main" xmlns:r="http://schemas.openxmlformats.org/officeDocument/2006/relationships" xmlns:p="http://schemas.openxmlformats.org/presentationml/2006/main">
+  <p:cSld>
+    <p:spTree>
+      <p:nvGrpSpPr>
+        <p:cNvPr id="1" name=""/>
+        <p:cNvGrpSpPr/>
+        <p:nvPr/>
+      </p:nvGrpSpPr>
+      <p:grpSpPr>
+        <a:xfrm>
+          <a:off x="0" y="0"/>
+          <a:ext cx="0" cy="0"/>
+          <a:chOff x="0" y="0"/>
+          <a:chExt cx="0" cy="0"/>
+        </a:xfrm>
+      </p:grpSpPr>
+      <p:sp>
+        <p:nvSpPr>
+          <p:cNvPr id="2" name="Titel 1"/>
+          <p:cNvSpPr>
+            <a:spLocks noGrp="1"/>
+          </p:cNvSpPr>
+          <p:nvPr>
+            <p:ph type="title"/>
+          </p:nvPr>
+        </p:nvSpPr>
+        <p:spPr>
+          <a:xfrm>
+            <a:off x="650875" y="390525"/>
+            <a:ext cx="11703050" cy="1245915"/>
+          </a:xfrm>
+        </p:spPr>
+        <p:txBody>
+          <a:bodyPr/>
+          <a:lstStyle/>
+          <a:p>
+            <a:r>
+              <a:rPr lang="de-DE" sz="4400" dirty="0" smtClean="0"/>
+              <a:t>Vergleich mit Projekt-</a:t>
+            </a:r>
+            <a:r>
+              <a:rPr lang="de-DE" sz="4400" dirty="0" smtClean="0"/>
+              <a:t>Generik</a:t>
+            </a:r>
+            <a:endParaRPr lang="de-DE" dirty="0"/>
+          </a:p>
+        </p:txBody>
+      </p:sp>
+      <p:sp>
+        <p:nvSpPr>
+          <p:cNvPr id="8" name="Rechteck 7"/>
+          <p:cNvSpPr/>
+          <p:nvPr/>
+        </p:nvSpPr>
+        <p:spPr bwMode="auto">
+          <a:xfrm>
+            <a:off x="453728" y="1708448"/>
+            <a:ext cx="12097344" cy="5760640"/>
+          </a:xfrm>
+          <a:prstGeom prst="rect">
+            <a:avLst/>
+          </a:prstGeom>
+          <a:solidFill>
+            <a:srgbClr val="FFFFFF"/>
+          </a:solidFill>
+          <a:ln w="38100" cap="flat" cmpd="sng" algn="ctr">
+            <a:solidFill>
+              <a:schemeClr val="accent1">
+                <a:lumMod val="75000"/>
+              </a:schemeClr>
+            </a:solidFill>
+            <a:prstDash val="solid"/>
+            <a:miter lim="0"/>
+            <a:headEnd type="none" w="med" len="med"/>
+            <a:tailEnd type="none" w="med" len="med"/>
+          </a:ln>
+          <a:effectLst>
+            <a:innerShdw blurRad="63500" dist="50800" dir="18900000">
+              <a:prstClr val="black">
+                <a:alpha val="50000"/>
+              </a:prstClr>
+            </a:innerShdw>
+            <a:softEdge rad="12700"/>
+          </a:effectLst>
+          <a:extLst/>
+        </p:spPr>
+        <p:txBody>
+          <a:bodyPr vert="horz" wrap="square" lIns="50800" tIns="50800" rIns="50800" bIns="50800" numCol="1" rtlCol="0" anchor="ctr" anchorCtr="0" compatLnSpc="1">
+            <a:prstTxWarp prst="textNoShape">
+              <a:avLst/>
+            </a:prstTxWarp>
+          </a:bodyPr>
+          <a:lstStyle/>
+          <a:p>
+            <a:pPr marL="342900"/>
+            <a:r>
+              <a:rPr lang="de-DE" sz="1400" dirty="0"/>
+              <a:t>Vergleich mit Vorlage</a:t>
+            </a:r>
+            <a:endParaRPr kumimoji="0" lang="de-DE" sz="1800" b="0" i="0" u="none" strike="noStrike" cap="none" normalizeH="0" baseline="0" dirty="0" smtClean="0">
+              <a:ln>
+                <a:noFill/>
+              </a:ln>
+              <a:solidFill>
+                <a:schemeClr val="bg2"/>
+              </a:solidFill>
+              <a:effectLst/>
+              <a:latin typeface="Gill Sans Light" charset="0"/>
+              <a:ea typeface="Gill Sans Light" charset="0"/>
+              <a:cs typeface="Gill Sans Light" charset="0"/>
+              <a:sym typeface="Gill Sans Light" charset="0"/>
+            </a:endParaRPr>
+          </a:p>
+        </p:txBody>
+      </p:sp>
+      <p:sp>
+        <p:nvSpPr>
+          <p:cNvPr id="10" name="Rechteck 9"/>
+          <p:cNvSpPr/>
+          <p:nvPr/>
+        </p:nvSpPr>
+        <p:spPr bwMode="auto">
+          <a:xfrm>
+            <a:off x="453728" y="8929194"/>
+            <a:ext cx="3478120" cy="340094"/>
+          </a:xfrm>
+          <a:prstGeom prst="rect">
+            <a:avLst/>
+          </a:prstGeom>
+          <a:solidFill>
+            <a:srgbClr val="FFFFFF"/>
+          </a:solidFill>
+          <a:ln w="38100" cap="flat" cmpd="sng" algn="ctr">
+            <a:solidFill>
+              <a:schemeClr val="accent1">
+                <a:lumMod val="75000"/>
+              </a:schemeClr>
+            </a:solidFill>
+            <a:prstDash val="solid"/>
+            <a:miter lim="0"/>
+            <a:headEnd type="none" w="med" len="med"/>
+            <a:tailEnd type="none" w="med" len="med"/>
+          </a:ln>
+          <a:effectLst>
+            <a:innerShdw blurRad="63500" dist="50800" dir="18900000">
+              <a:prstClr val="black">
+                <a:alpha val="50000"/>
+              </a:prstClr>
+            </a:innerShdw>
+            <a:softEdge rad="12700"/>
+          </a:effectLst>
+          <a:extLst/>
+        </p:spPr>
+        <p:txBody>
+          <a:bodyPr vert="horz" wrap="square" lIns="0" tIns="50800" rIns="50800" bIns="50800" numCol="1" rtlCol="0" anchor="ctr" anchorCtr="0" compatLnSpc="1">
+            <a:prstTxWarp prst="textNoShape">
+              <a:avLst/>
+            </a:prstTxWarp>
+          </a:bodyPr>
+          <a:lstStyle/>
+          <a:p>
+            <a:pPr marL="342900" algn="l"/>
+            <a:r>
+              <a:rPr lang="de-DE" sz="1400" dirty="0">
+                <a:solidFill>
+                  <a:schemeClr val="bg2"/>
+                </a:solidFill>
+              </a:rPr>
+              <a:t>Stand</a:t>
+            </a:r>
+            <a:r>
+              <a:rPr lang="de-DE" sz="1400" dirty="0" smtClean="0">
+                <a:solidFill>
+                  <a:schemeClr val="bg2"/>
+                </a:solidFill>
+              </a:rPr>
+              <a:t>:</a:t>
+            </a:r>
+            <a:endParaRPr lang="de-DE" sz="1400" dirty="0">
+              <a:solidFill>
+                <a:schemeClr val="bg2"/>
+              </a:solidFill>
+            </a:endParaRPr>
+          </a:p>
+        </p:txBody>
+      </p:sp>
+      <p:sp>
+        <p:nvSpPr>
+          <p:cNvPr id="14" name="Rechteck 13"/>
+          <p:cNvSpPr/>
+          <p:nvPr/>
+        </p:nvSpPr>
+        <p:spPr bwMode="auto">
+          <a:xfrm>
+            <a:off x="9216968" y="8929194"/>
+            <a:ext cx="3478120" cy="340094"/>
+          </a:xfrm>
+          <a:prstGeom prst="rect">
+            <a:avLst/>
+          </a:prstGeom>
+          <a:solidFill>
+            <a:srgbClr val="FFFFFF"/>
+          </a:solidFill>
+          <a:ln w="38100" cap="flat" cmpd="sng" algn="ctr">
+            <a:solidFill>
+              <a:schemeClr val="accent1">
+                <a:lumMod val="75000"/>
+              </a:schemeClr>
+            </a:solidFill>
+            <a:prstDash val="solid"/>
+            <a:miter lim="0"/>
+            <a:headEnd type="none" w="med" len="med"/>
+            <a:tailEnd type="none" w="med" len="med"/>
+          </a:ln>
+          <a:effectLst>
+            <a:innerShdw blurRad="63500" dist="50800" dir="18900000">
+              <a:prstClr val="black">
+                <a:alpha val="50000"/>
+              </a:prstClr>
+            </a:innerShdw>
+            <a:softEdge rad="12700"/>
+          </a:effectLst>
+          <a:extLst/>
+        </p:spPr>
+        <p:txBody>
+          <a:bodyPr vert="horz" wrap="square" lIns="0" tIns="50800" rIns="50800" bIns="50800" numCol="1" rtlCol="0" anchor="ctr" anchorCtr="0" compatLnSpc="1">
+            <a:prstTxWarp prst="textNoShape">
+              <a:avLst/>
+            </a:prstTxWarp>
+          </a:bodyPr>
+          <a:lstStyle/>
+          <a:p>
+            <a:pPr marL="342900" algn="l"/>
+            <a:r>
+              <a:rPr lang="de-DE" sz="1400" dirty="0">
+                <a:solidFill>
+                  <a:schemeClr val="bg2"/>
+                </a:solidFill>
+              </a:rPr>
+              <a:t>Verantwortlich:</a:t>
+            </a:r>
+          </a:p>
+        </p:txBody>
+      </p:sp>
+      <p:sp>
+        <p:nvSpPr>
+          <p:cNvPr id="15" name="Rechteck 14"/>
+          <p:cNvSpPr/>
+          <p:nvPr/>
+        </p:nvSpPr>
+        <p:spPr bwMode="auto">
+          <a:xfrm>
+            <a:off x="4835348" y="8929194"/>
+            <a:ext cx="3478120" cy="340094"/>
+          </a:xfrm>
+          <a:prstGeom prst="rect">
+            <a:avLst/>
+          </a:prstGeom>
+          <a:solidFill>
+            <a:srgbClr val="FFFFFF"/>
+          </a:solidFill>
+          <a:ln w="38100" cap="flat" cmpd="sng" algn="ctr">
+            <a:solidFill>
+              <a:schemeClr val="accent1">
+                <a:lumMod val="75000"/>
+              </a:schemeClr>
+            </a:solidFill>
+            <a:prstDash val="solid"/>
+            <a:miter lim="0"/>
+            <a:headEnd type="none" w="med" len="med"/>
+            <a:tailEnd type="none" w="med" len="med"/>
+          </a:ln>
+          <a:effectLst>
+            <a:innerShdw blurRad="63500" dist="50800" dir="18900000">
+              <a:prstClr val="black">
+                <a:alpha val="50000"/>
+              </a:prstClr>
+            </a:innerShdw>
+            <a:softEdge rad="12700"/>
+          </a:effectLst>
+          <a:extLst/>
+        </p:spPr>
+        <p:txBody>
+          <a:bodyPr vert="horz" wrap="square" lIns="0" tIns="50800" rIns="50800" bIns="50800" numCol="1" rtlCol="0" anchor="ctr" anchorCtr="0" compatLnSpc="1">
+            <a:prstTxWarp prst="textNoShape">
+              <a:avLst/>
+            </a:prstTxWarp>
+          </a:bodyPr>
+          <a:lstStyle/>
+          <a:p>
+            <a:pPr marL="342900" algn="l"/>
+            <a:r>
+              <a:rPr lang="de-DE" sz="1400" dirty="0">
+                <a:solidFill>
+                  <a:schemeClr val="bg2"/>
+                </a:solidFill>
+              </a:rPr>
+              <a:t>Laufzeit</a:t>
+            </a:r>
+            <a:r>
+              <a:rPr lang="de-DE" sz="1400" dirty="0" smtClean="0">
+                <a:solidFill>
+                  <a:schemeClr val="bg2"/>
+                </a:solidFill>
+              </a:rPr>
+              <a:t>:</a:t>
+            </a:r>
+            <a:endParaRPr lang="de-DE" sz="1400" dirty="0">
+              <a:solidFill>
+                <a:schemeClr val="bg2"/>
+              </a:solidFill>
+            </a:endParaRPr>
+          </a:p>
+        </p:txBody>
+      </p:sp>
+      <p:sp>
+        <p:nvSpPr>
+          <p:cNvPr id="3" name="Textfeld 2"/>
+          <p:cNvSpPr txBox="1"/>
+          <p:nvPr/>
+        </p:nvSpPr>
+        <p:spPr>
+          <a:xfrm>
+            <a:off x="488661" y="7807271"/>
+            <a:ext cx="5556329" cy="400110"/>
+          </a:xfrm>
+          <a:prstGeom prst="rect">
+            <a:avLst/>
+          </a:prstGeom>
+          <a:noFill/>
+        </p:spPr>
+        <p:txBody>
+          <a:bodyPr wrap="none" rtlCol="0">
+            <a:spAutoFit/>
+          </a:bodyPr>
+          <a:lstStyle/>
+          <a:p>
+            <a:pPr marL="171450" indent="-171450" algn="l">
+              <a:buFont typeface="Arial" panose="020B0604020202020204" pitchFamily="34" charset="0"/>
+              <a:buChar char="•"/>
+            </a:pPr>
+            <a:r>
+              <a:rPr lang="de-DE" sz="1000" dirty="0" smtClean="0"/>
+              <a:t>Phasen Abschnitte sind identisch, wenn die Phasen jeweils in Grau dargestellt werden</a:t>
+            </a:r>
+          </a:p>
+          <a:p>
+            <a:pPr marL="171450" indent="-171450" algn="l">
+              <a:buFont typeface="Arial" panose="020B0604020202020204" pitchFamily="34" charset="0"/>
+              <a:buChar char="•"/>
+            </a:pPr>
+            <a:r>
+              <a:rPr lang="de-DE" sz="1000" dirty="0" smtClean="0"/>
+              <a:t>Phasen abschnitte sind unterschiedlich, wenn die Phasen in Ihrer Farbe dargestellt werden   </a:t>
+            </a:r>
+            <a:endParaRPr lang="de-DE" sz="1000" dirty="0"/>
+          </a:p>
+        </p:txBody>
+      </p:sp>
+    </p:spTree>
+    <p:extLst>
+      <p:ext uri="{BB962C8B-B14F-4D97-AF65-F5344CB8AC3E}">
+        <p14:creationId xmlns:p14="http://schemas.microsoft.com/office/powerpoint/2010/main" val="1454176755"/>
+      </p:ext>
+    </p:extLst>
+  </p:cSld>
+  <p:clrMapOvr>
+    <a:masterClrMapping/>
+  </p:clrMapOvr>
+  <p:timing>
+    <p:tnLst>
+      <p:par>
+        <p:cTn id="1" dur="indefinite" restart="never" nodeType="tmRoot"/>
+      </p:par>
+    </p:tnLst>
+  </p:timing>
+</p:sld>
+</file>
+
+<file path=ppt/slides/slide5.xml><?xml version="1.0" encoding="utf-8"?>
+<p:sld xmlns:a="http://schemas.openxmlformats.org/drawingml/2006/main" xmlns:r="http://schemas.openxmlformats.org/officeDocument/2006/relationships" xmlns:p="http://schemas.openxmlformats.org/presentationml/2006/main">
+  <p:cSld>
+    <p:spTree>
+      <p:nvGrpSpPr>
+        <p:cNvPr id="1" name=""/>
+        <p:cNvGrpSpPr/>
+        <p:nvPr/>
+      </p:nvGrpSpPr>
+      <p:grpSpPr>
+        <a:xfrm>
+          <a:off x="0" y="0"/>
+          <a:ext cx="0" cy="0"/>
+          <a:chOff x="0" y="0"/>
+          <a:chExt cx="0" cy="0"/>
+        </a:xfrm>
+      </p:grpSpPr>
+      <p:sp>
+        <p:nvSpPr>
+          <p:cNvPr id="2" name="Titel 1"/>
+          <p:cNvSpPr>
+            <a:spLocks noGrp="1"/>
+          </p:cNvSpPr>
+          <p:nvPr>
+            <p:ph type="title"/>
+          </p:nvPr>
+        </p:nvSpPr>
+        <p:spPr>
+          <a:xfrm>
+            <a:off x="650875" y="390525"/>
+            <a:ext cx="11703050" cy="1245915"/>
+          </a:xfrm>
+        </p:spPr>
+        <p:txBody>
+          <a:bodyPr/>
+          <a:lstStyle/>
+          <a:p>
+            <a:r>
+              <a:rPr lang="de-DE" sz="4400" dirty="0" smtClean="0"/>
+              <a:t>Vergleich mit Beauftragungs-Stand</a:t>
+            </a:r>
+            <a:endParaRPr lang="de-DE" dirty="0"/>
+          </a:p>
+        </p:txBody>
+      </p:sp>
+      <p:sp>
+        <p:nvSpPr>
+          <p:cNvPr id="8" name="Rechteck 7"/>
+          <p:cNvSpPr/>
+          <p:nvPr/>
+        </p:nvSpPr>
+        <p:spPr bwMode="auto">
+          <a:xfrm>
+            <a:off x="453728" y="1708448"/>
+            <a:ext cx="12097344" cy="5760640"/>
+          </a:xfrm>
+          <a:prstGeom prst="rect">
+            <a:avLst/>
+          </a:prstGeom>
+          <a:solidFill>
+            <a:srgbClr val="FFFFFF"/>
+          </a:solidFill>
+          <a:ln w="38100" cap="flat" cmpd="sng" algn="ctr">
+            <a:solidFill>
+              <a:schemeClr val="accent1">
+                <a:lumMod val="75000"/>
+              </a:schemeClr>
+            </a:solidFill>
+            <a:prstDash val="solid"/>
+            <a:miter lim="0"/>
+            <a:headEnd type="none" w="med" len="med"/>
+            <a:tailEnd type="none" w="med" len="med"/>
+          </a:ln>
+          <a:effectLst>
+            <a:innerShdw blurRad="63500" dist="50800" dir="18900000">
+              <a:prstClr val="black">
+                <a:alpha val="50000"/>
+              </a:prstClr>
+            </a:innerShdw>
+            <a:softEdge rad="12700"/>
+          </a:effectLst>
+          <a:extLst/>
+        </p:spPr>
+        <p:txBody>
+          <a:bodyPr vert="horz" wrap="square" lIns="50800" tIns="50800" rIns="50800" bIns="50800" numCol="1" rtlCol="0" anchor="ctr" anchorCtr="0" compatLnSpc="1">
+            <a:prstTxWarp prst="textNoShape">
+              <a:avLst/>
+            </a:prstTxWarp>
+          </a:bodyPr>
+          <a:lstStyle/>
+          <a:p>
+            <a:pPr marL="342900"/>
+            <a:r>
+              <a:rPr lang="de-DE" sz="1400" dirty="0"/>
+              <a:t>Vergleich mit </a:t>
+            </a:r>
+            <a:r>
+              <a:rPr lang="de-DE" sz="1400" dirty="0" smtClean="0"/>
+              <a:t>Beauftragung</a:t>
+            </a:r>
+            <a:endParaRPr kumimoji="0" lang="de-DE" sz="1800" b="0" i="0" u="none" strike="noStrike" cap="none" normalizeH="0" baseline="0" dirty="0" smtClean="0">
+              <a:ln>
+                <a:noFill/>
+              </a:ln>
+              <a:solidFill>
+                <a:schemeClr val="bg2"/>
+              </a:solidFill>
+              <a:effectLst/>
+              <a:latin typeface="Gill Sans Light" charset="0"/>
+              <a:ea typeface="Gill Sans Light" charset="0"/>
+              <a:cs typeface="Gill Sans Light" charset="0"/>
+              <a:sym typeface="Gill Sans Light" charset="0"/>
+            </a:endParaRPr>
+          </a:p>
+        </p:txBody>
+      </p:sp>
+      <p:sp>
+        <p:nvSpPr>
+          <p:cNvPr id="10" name="Rechteck 9"/>
+          <p:cNvSpPr/>
+          <p:nvPr/>
+        </p:nvSpPr>
+        <p:spPr bwMode="auto">
+          <a:xfrm>
+            <a:off x="453728" y="8929194"/>
+            <a:ext cx="3478120" cy="340094"/>
+          </a:xfrm>
+          <a:prstGeom prst="rect">
+            <a:avLst/>
+          </a:prstGeom>
+          <a:solidFill>
+            <a:srgbClr val="FFFFFF"/>
+          </a:solidFill>
+          <a:ln w="38100" cap="flat" cmpd="sng" algn="ctr">
+            <a:solidFill>
+              <a:schemeClr val="accent1">
+                <a:lumMod val="75000"/>
+              </a:schemeClr>
+            </a:solidFill>
+            <a:prstDash val="solid"/>
+            <a:miter lim="0"/>
+            <a:headEnd type="none" w="med" len="med"/>
+            <a:tailEnd type="none" w="med" len="med"/>
+          </a:ln>
+          <a:effectLst>
+            <a:innerShdw blurRad="63500" dist="50800" dir="18900000">
+              <a:prstClr val="black">
+                <a:alpha val="50000"/>
+              </a:prstClr>
+            </a:innerShdw>
+            <a:softEdge rad="12700"/>
+          </a:effectLst>
+          <a:extLst/>
+        </p:spPr>
+        <p:txBody>
+          <a:bodyPr vert="horz" wrap="square" lIns="0" tIns="50800" rIns="50800" bIns="50800" numCol="1" rtlCol="0" anchor="ctr" anchorCtr="0" compatLnSpc="1">
+            <a:prstTxWarp prst="textNoShape">
+              <a:avLst/>
+            </a:prstTxWarp>
+          </a:bodyPr>
+          <a:lstStyle/>
+          <a:p>
+            <a:pPr marL="342900" algn="l"/>
+            <a:r>
+              <a:rPr lang="de-DE" sz="1400" dirty="0">
+                <a:solidFill>
+                  <a:schemeClr val="bg2"/>
+                </a:solidFill>
+              </a:rPr>
+              <a:t>Stand</a:t>
+            </a:r>
+            <a:r>
+              <a:rPr lang="de-DE" sz="1400" dirty="0" smtClean="0">
+                <a:solidFill>
+                  <a:schemeClr val="bg2"/>
+                </a:solidFill>
+              </a:rPr>
+              <a:t>:</a:t>
+            </a:r>
+            <a:endParaRPr lang="de-DE" sz="1400" dirty="0">
+              <a:solidFill>
+                <a:schemeClr val="bg2"/>
+              </a:solidFill>
+            </a:endParaRPr>
+          </a:p>
+        </p:txBody>
+      </p:sp>
+      <p:sp>
+        <p:nvSpPr>
+          <p:cNvPr id="14" name="Rechteck 13"/>
+          <p:cNvSpPr/>
+          <p:nvPr/>
+        </p:nvSpPr>
+        <p:spPr bwMode="auto">
+          <a:xfrm>
+            <a:off x="9216968" y="8929194"/>
+            <a:ext cx="3478120" cy="340094"/>
+          </a:xfrm>
+          <a:prstGeom prst="rect">
+            <a:avLst/>
+          </a:prstGeom>
+          <a:solidFill>
+            <a:srgbClr val="FFFFFF"/>
+          </a:solidFill>
+          <a:ln w="38100" cap="flat" cmpd="sng" algn="ctr">
+            <a:solidFill>
+              <a:schemeClr val="accent1">
+                <a:lumMod val="75000"/>
+              </a:schemeClr>
+            </a:solidFill>
+            <a:prstDash val="solid"/>
+            <a:miter lim="0"/>
+            <a:headEnd type="none" w="med" len="med"/>
+            <a:tailEnd type="none" w="med" len="med"/>
+          </a:ln>
+          <a:effectLst>
+            <a:innerShdw blurRad="63500" dist="50800" dir="18900000">
+              <a:prstClr val="black">
+                <a:alpha val="50000"/>
+              </a:prstClr>
+            </a:innerShdw>
+            <a:softEdge rad="12700"/>
+          </a:effectLst>
+          <a:extLst/>
+        </p:spPr>
+        <p:txBody>
+          <a:bodyPr vert="horz" wrap="square" lIns="0" tIns="50800" rIns="50800" bIns="50800" numCol="1" rtlCol="0" anchor="ctr" anchorCtr="0" compatLnSpc="1">
+            <a:prstTxWarp prst="textNoShape">
+              <a:avLst/>
+            </a:prstTxWarp>
+          </a:bodyPr>
+          <a:lstStyle/>
+          <a:p>
+            <a:pPr marL="342900" algn="l"/>
+            <a:r>
+              <a:rPr lang="de-DE" sz="1400" dirty="0">
+                <a:solidFill>
+                  <a:schemeClr val="bg2"/>
+                </a:solidFill>
+              </a:rPr>
+              <a:t>Verantwortlich:</a:t>
+            </a:r>
+          </a:p>
+        </p:txBody>
+      </p:sp>
+      <p:sp>
+        <p:nvSpPr>
+          <p:cNvPr id="15" name="Rechteck 14"/>
+          <p:cNvSpPr/>
+          <p:nvPr/>
+        </p:nvSpPr>
+        <p:spPr bwMode="auto">
+          <a:xfrm>
+            <a:off x="4835348" y="8929194"/>
+            <a:ext cx="3478120" cy="340094"/>
+          </a:xfrm>
+          <a:prstGeom prst="rect">
+            <a:avLst/>
+          </a:prstGeom>
+          <a:solidFill>
+            <a:srgbClr val="FFFFFF"/>
+          </a:solidFill>
+          <a:ln w="38100" cap="flat" cmpd="sng" algn="ctr">
+            <a:solidFill>
+              <a:schemeClr val="accent1">
+                <a:lumMod val="75000"/>
+              </a:schemeClr>
+            </a:solidFill>
+            <a:prstDash val="solid"/>
+            <a:miter lim="0"/>
+            <a:headEnd type="none" w="med" len="med"/>
+            <a:tailEnd type="none" w="med" len="med"/>
+          </a:ln>
+          <a:effectLst>
+            <a:innerShdw blurRad="63500" dist="50800" dir="18900000">
+              <a:prstClr val="black">
+                <a:alpha val="50000"/>
+              </a:prstClr>
+            </a:innerShdw>
+            <a:softEdge rad="12700"/>
+          </a:effectLst>
+          <a:extLst/>
+        </p:spPr>
+        <p:txBody>
+          <a:bodyPr vert="horz" wrap="square" lIns="0" tIns="50800" rIns="50800" bIns="50800" numCol="1" rtlCol="0" anchor="ctr" anchorCtr="0" compatLnSpc="1">
+            <a:prstTxWarp prst="textNoShape">
+              <a:avLst/>
+            </a:prstTxWarp>
+          </a:bodyPr>
+          <a:lstStyle/>
+          <a:p>
+            <a:pPr marL="342900" algn="l"/>
+            <a:r>
+              <a:rPr lang="de-DE" sz="1400" dirty="0">
+                <a:solidFill>
+                  <a:schemeClr val="bg2"/>
+                </a:solidFill>
+              </a:rPr>
+              <a:t>Laufzeit</a:t>
+            </a:r>
+            <a:r>
+              <a:rPr lang="de-DE" sz="1400" dirty="0" smtClean="0">
+                <a:solidFill>
+                  <a:schemeClr val="bg2"/>
+                </a:solidFill>
+              </a:rPr>
+              <a:t>:</a:t>
+            </a:r>
+            <a:endParaRPr lang="de-DE" sz="1400" dirty="0">
+              <a:solidFill>
+                <a:schemeClr val="bg2"/>
+              </a:solidFill>
+            </a:endParaRPr>
+          </a:p>
+        </p:txBody>
+      </p:sp>
+      <p:sp>
+        <p:nvSpPr>
+          <p:cNvPr id="3" name="Textfeld 2"/>
+          <p:cNvSpPr txBox="1"/>
+          <p:nvPr/>
+        </p:nvSpPr>
+        <p:spPr>
+          <a:xfrm>
+            <a:off x="488661" y="7807271"/>
+            <a:ext cx="5556329" cy="400110"/>
+          </a:xfrm>
+          <a:prstGeom prst="rect">
+            <a:avLst/>
+          </a:prstGeom>
+          <a:noFill/>
+        </p:spPr>
+        <p:txBody>
+          <a:bodyPr wrap="none" rtlCol="0">
+            <a:spAutoFit/>
+          </a:bodyPr>
+          <a:lstStyle/>
+          <a:p>
+            <a:pPr marL="171450" indent="-171450" algn="l">
+              <a:buFont typeface="Arial" panose="020B0604020202020204" pitchFamily="34" charset="0"/>
+              <a:buChar char="•"/>
+            </a:pPr>
+            <a:r>
+              <a:rPr lang="de-DE" sz="1000" dirty="0" smtClean="0"/>
+              <a:t>Phasen Abschnitte sind identisch, wenn die Phasen jeweils in Grau dargestellt werden</a:t>
+            </a:r>
+          </a:p>
+          <a:p>
+            <a:pPr marL="171450" indent="-171450" algn="l">
+              <a:buFont typeface="Arial" panose="020B0604020202020204" pitchFamily="34" charset="0"/>
+              <a:buChar char="•"/>
+            </a:pPr>
+            <a:r>
+              <a:rPr lang="de-DE" sz="1000" dirty="0" smtClean="0"/>
+              <a:t>Phasen abschnitte sind unterschiedlich, wenn die Phasen in Ihrer Farbe dargestellt werden   </a:t>
+            </a:r>
+            <a:endParaRPr lang="de-DE" sz="1000" dirty="0"/>
+          </a:p>
+        </p:txBody>
+      </p:sp>
+    </p:spTree>
+    <p:extLst>
+      <p:ext uri="{BB962C8B-B14F-4D97-AF65-F5344CB8AC3E}">
+        <p14:creationId xmlns:p14="http://schemas.microsoft.com/office/powerpoint/2010/main" val="1580426209"/>
+      </p:ext>
+    </p:extLst>
+  </p:cSld>
+  <p:clrMapOvr>
+    <a:masterClrMapping/>
+  </p:clrMapOvr>
+  <p:timing>
+    <p:tnLst>
+      <p:par>
+        <p:cTn id="1" dur="indefinite" restart="never" nodeType="tmRoot"/>
+      </p:par>
+    </p:tnLst>
+  </p:timing>
+</p:sld>
+</file>
+
+<file path=ppt/slides/slide6.xml><?xml version="1.0" encoding="utf-8"?>
 <p:sld xmlns:a="http://schemas.openxmlformats.org/drawingml/2006/main" xmlns:r="http://schemas.openxmlformats.org/officeDocument/2006/relationships" xmlns:p="http://schemas.openxmlformats.org/presentationml/2006/main">
   <p:cSld>
     <p:spTree>

</xml_diff>